<commit_message>
FINAL PRESENTATION - Version 2
</commit_message>
<xml_diff>
--- a/Data Analytics- Project3 Team7 Final Draft.pptx
+++ b/Data Analytics- Project3 Team7 Final Draft.pptx
@@ -5,7 +5,7 @@
     <p:sldMasterId id="2147483660" r:id="rId4"/>
   </p:sldMasterIdLst>
   <p:notesMasterIdLst>
-    <p:notesMasterId r:id="rId41"/>
+    <p:notesMasterId r:id="rId42"/>
   </p:notesMasterIdLst>
   <p:sldIdLst>
     <p:sldId id="298" r:id="rId5"/>
@@ -44,6 +44,7 @@
     <p:sldId id="347" r:id="rId38"/>
     <p:sldId id="354" r:id="rId39"/>
     <p:sldId id="355" r:id="rId40"/>
+    <p:sldId id="356" r:id="rId41"/>
   </p:sldIdLst>
   <p:sldSz cx="12192000" cy="6858000"/>
   <p:notesSz cx="6858000" cy="9144000"/>
@@ -549,7 +550,24 @@
           <a:bodyPr/>
           <a:lstStyle/>
           <a:p>
-            <a:endParaRPr lang="en-US" dirty="0"/>
+            <a:r>
+              <a:rPr lang="en-US" dirty="0"/>
+              <a:t>Coronaviruses are a large family of viruses, most common known types were </a:t>
+            </a:r>
+            <a:r>
+              <a:rPr lang="en-US" b="0" i="0" dirty="0">
+                <a:solidFill>
+                  <a:srgbClr val="222222"/>
+                </a:solidFill>
+                <a:effectLst/>
+                <a:latin typeface="Arial" panose="020B0604020202020204" pitchFamily="34" charset="0"/>
+              </a:rPr>
+              <a:t>Middle East Respiratory Syndrome (MERS) and Severe Acute Respiratory Syndrome (SARS).</a:t>
+            </a:r>
+            <a:r>
+              <a:rPr lang="en-US" dirty="0"/>
+              <a:t> </a:t>
+            </a:r>
           </a:p>
         </p:txBody>
       </p:sp>
@@ -570,7 +588,7 @@
           <a:p>
             <a:fld id="{E2B2A73B-86D2-4CA9-B04D-BA507D4C2C8C}" type="slidenum">
               <a:rPr lang="en-US" smtClean="0"/>
-              <a:t>7</a:t>
+              <a:t>5</a:t>
             </a:fld>
             <a:endParaRPr lang="en-US"/>
           </a:p>
@@ -579,7 +597,7 @@
     </p:spTree>
     <p:extLst>
       <p:ext uri="{BB962C8B-B14F-4D97-AF65-F5344CB8AC3E}">
-        <p14:creationId xmlns:p14="http://schemas.microsoft.com/office/powerpoint/2010/main" val="970516300"/>
+        <p14:creationId xmlns:p14="http://schemas.microsoft.com/office/powerpoint/2010/main" val="2063400345"/>
       </p:ext>
     </p:extLst>
   </p:cSld>
@@ -633,7 +651,10 @@
           <a:bodyPr/>
           <a:lstStyle/>
           <a:p>
-            <a:endParaRPr lang="en-US" dirty="0"/>
+            <a:r>
+              <a:rPr lang="en-US" dirty="0"/>
+              <a:t>Grace</a:t>
+            </a:r>
           </a:p>
         </p:txBody>
       </p:sp>
@@ -654,7 +675,7 @@
           <a:p>
             <a:fld id="{E2B2A73B-86D2-4CA9-B04D-BA507D4C2C8C}" type="slidenum">
               <a:rPr lang="en-US" smtClean="0"/>
-              <a:t>22</a:t>
+              <a:t>21</a:t>
             </a:fld>
             <a:endParaRPr lang="en-US"/>
           </a:p>
@@ -663,7 +684,7 @@
     </p:spTree>
     <p:extLst>
       <p:ext uri="{BB962C8B-B14F-4D97-AF65-F5344CB8AC3E}">
-        <p14:creationId xmlns:p14="http://schemas.microsoft.com/office/powerpoint/2010/main" val="2024961118"/>
+        <p14:creationId xmlns:p14="http://schemas.microsoft.com/office/powerpoint/2010/main" val="2009066719"/>
       </p:ext>
     </p:extLst>
   </p:cSld>
@@ -717,32 +738,6 @@
           <a:bodyPr/>
           <a:lstStyle/>
           <a:p>
-            <a:pPr marL="0" marR="0" lvl="0" indent="0" algn="l" defTabSz="914400" rtl="0" eaLnBrk="1" fontAlgn="auto" latinLnBrk="0" hangingPunct="1">
-              <a:lnSpc>
-                <a:spcPct val="100000"/>
-              </a:lnSpc>
-              <a:spcBef>
-                <a:spcPts val="0"/>
-              </a:spcBef>
-              <a:spcAft>
-                <a:spcPts val="0"/>
-              </a:spcAft>
-              <a:buClrTx/>
-              <a:buSzTx/>
-              <a:buFontTx/>
-              <a:buNone/>
-              <a:tabLst/>
-              <a:defRPr/>
-            </a:pPr>
-            <a:r>
-              <a:rPr lang="en-US" i="1" dirty="0">
-                <a:latin typeface="Calibri" panose="020F0502020204030204" pitchFamily="34" charset="0"/>
-                <a:cs typeface="Calibri" panose="020F0502020204030204" pitchFamily="34" charset="0"/>
-              </a:rPr>
-              <a:t>We also looked at the number of days it took for each lab to process and return the result. On average it took 4 days to get the result back from the labs. The highest number of days for one patient was 42 days. LAB1930 had the quickest turnaround time. </a:t>
-            </a:r>
-          </a:p>
-          <a:p>
             <a:endParaRPr lang="en-US" dirty="0"/>
           </a:p>
         </p:txBody>
@@ -764,7 +759,7 @@
           <a:p>
             <a:fld id="{E2B2A73B-86D2-4CA9-B04D-BA507D4C2C8C}" type="slidenum">
               <a:rPr lang="en-US" smtClean="0"/>
-              <a:t>23</a:t>
+              <a:t>22</a:t>
             </a:fld>
             <a:endParaRPr lang="en-US"/>
           </a:p>
@@ -773,7 +768,7 @@
     </p:spTree>
     <p:extLst>
       <p:ext uri="{BB962C8B-B14F-4D97-AF65-F5344CB8AC3E}">
-        <p14:creationId xmlns:p14="http://schemas.microsoft.com/office/powerpoint/2010/main" val="3261796145"/>
+        <p14:creationId xmlns:p14="http://schemas.microsoft.com/office/powerpoint/2010/main" val="2024961118"/>
       </p:ext>
     </p:extLst>
   </p:cSld>
@@ -827,6 +822,32 @@
           <a:bodyPr/>
           <a:lstStyle/>
           <a:p>
+            <a:pPr marL="0" marR="0" lvl="0" indent="0" algn="l" defTabSz="914400" rtl="0" eaLnBrk="1" fontAlgn="auto" latinLnBrk="0" hangingPunct="1">
+              <a:lnSpc>
+                <a:spcPct val="100000"/>
+              </a:lnSpc>
+              <a:spcBef>
+                <a:spcPts val="0"/>
+              </a:spcBef>
+              <a:spcAft>
+                <a:spcPts val="0"/>
+              </a:spcAft>
+              <a:buClrTx/>
+              <a:buSzTx/>
+              <a:buFontTx/>
+              <a:buNone/>
+              <a:tabLst/>
+              <a:defRPr/>
+            </a:pPr>
+            <a:r>
+              <a:rPr lang="en-US" i="1" dirty="0">
+                <a:latin typeface="Calibri" panose="020F0502020204030204" pitchFamily="34" charset="0"/>
+                <a:cs typeface="Calibri" panose="020F0502020204030204" pitchFamily="34" charset="0"/>
+              </a:rPr>
+              <a:t>We also looked at the number of days it took for each lab to process and return the result. On average it took 4 days to get the result back from the labs. The highest number of days for one patient was 42 days. LAB1930 had the quickest turnaround time. </a:t>
+            </a:r>
+          </a:p>
+          <a:p>
             <a:endParaRPr lang="en-US" dirty="0"/>
           </a:p>
         </p:txBody>
@@ -848,7 +869,7 @@
           <a:p>
             <a:fld id="{E2B2A73B-86D2-4CA9-B04D-BA507D4C2C8C}" type="slidenum">
               <a:rPr lang="en-US" smtClean="0"/>
-              <a:t>24</a:t>
+              <a:t>23</a:t>
             </a:fld>
             <a:endParaRPr lang="en-US"/>
           </a:p>
@@ -857,7 +878,7 @@
     </p:spTree>
     <p:extLst>
       <p:ext uri="{BB962C8B-B14F-4D97-AF65-F5344CB8AC3E}">
-        <p14:creationId xmlns:p14="http://schemas.microsoft.com/office/powerpoint/2010/main" val="419958375"/>
+        <p14:creationId xmlns:p14="http://schemas.microsoft.com/office/powerpoint/2010/main" val="3261796145"/>
       </p:ext>
     </p:extLst>
   </p:cSld>
@@ -932,7 +953,7 @@
           <a:p>
             <a:fld id="{E2B2A73B-86D2-4CA9-B04D-BA507D4C2C8C}" type="slidenum">
               <a:rPr lang="en-US" smtClean="0"/>
-              <a:t>25</a:t>
+              <a:t>24</a:t>
             </a:fld>
             <a:endParaRPr lang="en-US"/>
           </a:p>
@@ -941,7 +962,7 @@
     </p:spTree>
     <p:extLst>
       <p:ext uri="{BB962C8B-B14F-4D97-AF65-F5344CB8AC3E}">
-        <p14:creationId xmlns:p14="http://schemas.microsoft.com/office/powerpoint/2010/main" val="3320347371"/>
+        <p14:creationId xmlns:p14="http://schemas.microsoft.com/office/powerpoint/2010/main" val="419958375"/>
       </p:ext>
     </p:extLst>
   </p:cSld>
@@ -1016,7 +1037,7 @@
           <a:p>
             <a:fld id="{E2B2A73B-86D2-4CA9-B04D-BA507D4C2C8C}" type="slidenum">
               <a:rPr lang="en-US" smtClean="0"/>
-              <a:t>33</a:t>
+              <a:t>25</a:t>
             </a:fld>
             <a:endParaRPr lang="en-US"/>
           </a:p>
@@ -1025,7 +1046,7 @@
     </p:spTree>
     <p:extLst>
       <p:ext uri="{BB962C8B-B14F-4D97-AF65-F5344CB8AC3E}">
-        <p14:creationId xmlns:p14="http://schemas.microsoft.com/office/powerpoint/2010/main" val="2808918434"/>
+        <p14:creationId xmlns:p14="http://schemas.microsoft.com/office/powerpoint/2010/main" val="3320347371"/>
       </p:ext>
     </p:extLst>
   </p:cSld>
@@ -1100,6 +1121,90 @@
           <a:p>
             <a:fld id="{E2B2A73B-86D2-4CA9-B04D-BA507D4C2C8C}" type="slidenum">
               <a:rPr lang="en-US" smtClean="0"/>
+              <a:t>33</a:t>
+            </a:fld>
+            <a:endParaRPr lang="en-US"/>
+          </a:p>
+        </p:txBody>
+      </p:sp>
+    </p:spTree>
+    <p:extLst>
+      <p:ext uri="{BB962C8B-B14F-4D97-AF65-F5344CB8AC3E}">
+        <p14:creationId xmlns:p14="http://schemas.microsoft.com/office/powerpoint/2010/main" val="2808918434"/>
+      </p:ext>
+    </p:extLst>
+  </p:cSld>
+  <p:clrMapOvr>
+    <a:masterClrMapping/>
+  </p:clrMapOvr>
+</p:notes>
+</file>
+
+<file path=ppt/notesSlides/notesSlide16.xml><?xml version="1.0" encoding="utf-8"?>
+<p:notes xmlns:a="http://schemas.openxmlformats.org/drawingml/2006/main" xmlns:r="http://schemas.openxmlformats.org/officeDocument/2006/relationships" xmlns:p="http://schemas.openxmlformats.org/presentationml/2006/main">
+  <p:cSld>
+    <p:spTree>
+      <p:nvGrpSpPr>
+        <p:cNvPr id="1" name=""/>
+        <p:cNvGrpSpPr/>
+        <p:nvPr/>
+      </p:nvGrpSpPr>
+      <p:grpSpPr>
+        <a:xfrm>
+          <a:off x="0" y="0"/>
+          <a:ext cx="0" cy="0"/>
+          <a:chOff x="0" y="0"/>
+          <a:chExt cx="0" cy="0"/>
+        </a:xfrm>
+      </p:grpSpPr>
+      <p:sp>
+        <p:nvSpPr>
+          <p:cNvPr id="2" name="Slide Image Placeholder 1"/>
+          <p:cNvSpPr>
+            <a:spLocks noGrp="1" noRot="1" noChangeAspect="1"/>
+          </p:cNvSpPr>
+          <p:nvPr>
+            <p:ph type="sldImg"/>
+          </p:nvPr>
+        </p:nvSpPr>
+        <p:spPr/>
+      </p:sp>
+      <p:sp>
+        <p:nvSpPr>
+          <p:cNvPr id="3" name="Notes Placeholder 2"/>
+          <p:cNvSpPr>
+            <a:spLocks noGrp="1"/>
+          </p:cNvSpPr>
+          <p:nvPr>
+            <p:ph type="body" idx="1"/>
+          </p:nvPr>
+        </p:nvSpPr>
+        <p:spPr/>
+        <p:txBody>
+          <a:bodyPr/>
+          <a:lstStyle/>
+          <a:p>
+            <a:endParaRPr lang="en-US" dirty="0"/>
+          </a:p>
+        </p:txBody>
+      </p:sp>
+      <p:sp>
+        <p:nvSpPr>
+          <p:cNvPr id="4" name="Slide Number Placeholder 3"/>
+          <p:cNvSpPr>
+            <a:spLocks noGrp="1"/>
+          </p:cNvSpPr>
+          <p:nvPr>
+            <p:ph type="sldNum" sz="quarter" idx="5"/>
+          </p:nvPr>
+        </p:nvSpPr>
+        <p:spPr/>
+        <p:txBody>
+          <a:bodyPr/>
+          <a:lstStyle/>
+          <a:p>
+            <a:fld id="{E2B2A73B-86D2-4CA9-B04D-BA507D4C2C8C}" type="slidenum">
+              <a:rPr lang="en-US" smtClean="0"/>
               <a:t>35</a:t>
             </a:fld>
             <a:endParaRPr lang="en-US"/>
@@ -1119,7 +1224,7 @@
 </p:notes>
 </file>
 
-<file path=ppt/notesSlides/notesSlide16.xml><?xml version="1.0" encoding="utf-8"?>
+<file path=ppt/notesSlides/notesSlide17.xml><?xml version="1.0" encoding="utf-8"?>
 <p:notes xmlns:a="http://schemas.openxmlformats.org/drawingml/2006/main" xmlns:r="http://schemas.openxmlformats.org/officeDocument/2006/relationships" xmlns:p="http://schemas.openxmlformats.org/presentationml/2006/main">
   <p:cSld>
     <p:spTree>
@@ -1247,13 +1352,7 @@
           <a:bodyPr/>
           <a:lstStyle/>
           <a:p>
-            <a:endParaRPr lang="en-US" dirty="0">
-              <a:solidFill>
-                <a:schemeClr val="tx1">
-                  <a:lumMod val="85000"/>
-                </a:schemeClr>
-              </a:solidFill>
-            </a:endParaRPr>
+            <a:endParaRPr lang="en-US" dirty="0"/>
           </a:p>
         </p:txBody>
       </p:sp>
@@ -1274,7 +1373,7 @@
           <a:p>
             <a:fld id="{E2B2A73B-86D2-4CA9-B04D-BA507D4C2C8C}" type="slidenum">
               <a:rPr lang="en-US" smtClean="0"/>
-              <a:t>12</a:t>
+              <a:t>7</a:t>
             </a:fld>
             <a:endParaRPr lang="en-US"/>
           </a:p>
@@ -1283,7 +1382,7 @@
     </p:spTree>
     <p:extLst>
       <p:ext uri="{BB962C8B-B14F-4D97-AF65-F5344CB8AC3E}">
-        <p14:creationId xmlns:p14="http://schemas.microsoft.com/office/powerpoint/2010/main" val="2245320201"/>
+        <p14:creationId xmlns:p14="http://schemas.microsoft.com/office/powerpoint/2010/main" val="970516300"/>
       </p:ext>
     </p:extLst>
   </p:cSld>
@@ -1337,16 +1436,13 @@
           <a:bodyPr/>
           <a:lstStyle/>
           <a:p>
-            <a:r>
-              <a:rPr lang="en-US" sz="3600" b="1" dirty="0"/>
-              <a:t>Total Male Patients – 479</a:t>
-            </a:r>
-          </a:p>
-          <a:p>
-            <a:r>
-              <a:rPr lang="en-US" sz="3600" b="1" dirty="0"/>
-              <a:t>Total Female Patients - 360</a:t>
-            </a:r>
+            <a:endParaRPr lang="en-US" dirty="0">
+              <a:solidFill>
+                <a:schemeClr val="tx1">
+                  <a:lumMod val="85000"/>
+                </a:schemeClr>
+              </a:solidFill>
+            </a:endParaRPr>
           </a:p>
         </p:txBody>
       </p:sp>
@@ -1367,7 +1463,7 @@
           <a:p>
             <a:fld id="{E2B2A73B-86D2-4CA9-B04D-BA507D4C2C8C}" type="slidenum">
               <a:rPr lang="en-US" smtClean="0"/>
-              <a:t>13</a:t>
+              <a:t>12</a:t>
             </a:fld>
             <a:endParaRPr lang="en-US"/>
           </a:p>
@@ -1376,7 +1472,7 @@
     </p:spTree>
     <p:extLst>
       <p:ext uri="{BB962C8B-B14F-4D97-AF65-F5344CB8AC3E}">
-        <p14:creationId xmlns:p14="http://schemas.microsoft.com/office/powerpoint/2010/main" val="167506530"/>
+        <p14:creationId xmlns:p14="http://schemas.microsoft.com/office/powerpoint/2010/main" val="2245320201"/>
       </p:ext>
     </p:extLst>
   </p:cSld>
@@ -1431,18 +1527,15 @@
           <a:lstStyle/>
           <a:p>
             <a:r>
-              <a:rPr lang="en-US" sz="1200" b="1" dirty="0"/>
+              <a:rPr lang="en-US" sz="3600" b="1" dirty="0"/>
               <a:t>Total Male Patients – 479</a:t>
             </a:r>
           </a:p>
           <a:p>
             <a:r>
-              <a:rPr lang="en-US" sz="1200" b="1" dirty="0"/>
+              <a:rPr lang="en-US" sz="3600" b="1" dirty="0"/>
               <a:t>Total Female Patients - 360</a:t>
             </a:r>
-          </a:p>
-          <a:p>
-            <a:endParaRPr lang="en-US" dirty="0"/>
           </a:p>
         </p:txBody>
       </p:sp>
@@ -1463,7 +1556,7 @@
           <a:p>
             <a:fld id="{E2B2A73B-86D2-4CA9-B04D-BA507D4C2C8C}" type="slidenum">
               <a:rPr lang="en-US" smtClean="0"/>
-              <a:t>14</a:t>
+              <a:t>13</a:t>
             </a:fld>
             <a:endParaRPr lang="en-US"/>
           </a:p>
@@ -1472,7 +1565,7 @@
     </p:spTree>
     <p:extLst>
       <p:ext uri="{BB962C8B-B14F-4D97-AF65-F5344CB8AC3E}">
-        <p14:creationId xmlns:p14="http://schemas.microsoft.com/office/powerpoint/2010/main" val="76338607"/>
+        <p14:creationId xmlns:p14="http://schemas.microsoft.com/office/powerpoint/2010/main" val="167506530"/>
       </p:ext>
     </p:extLst>
   </p:cSld>
@@ -1526,25 +1619,28 @@
           <a:bodyPr/>
           <a:lstStyle/>
           <a:p>
+            <a:r>
+              <a:rPr lang="en-US" sz="1200" b="1" dirty="0"/>
+              <a:t>Total Male Patients – 479</a:t>
+            </a:r>
+          </a:p>
+          <a:p>
+            <a:r>
+              <a:rPr lang="en-US" sz="1200" b="1" dirty="0"/>
+              <a:t>Total Female Patients – 360</a:t>
+            </a:r>
+          </a:p>
+          <a:p>
+            <a:endParaRPr lang="en-US" sz="1200" b="1" dirty="0"/>
+          </a:p>
+          <a:p>
+            <a:r>
+              <a:rPr lang="en-US" sz="1200" b="1" dirty="0"/>
+              <a:t>Looking at the total number of cases per month, the frequency of cases shows that there are more male patients that were affected by COVID-19 in Harlem</a:t>
+            </a:r>
+          </a:p>
+          <a:p>
             <a:endParaRPr lang="en-US" dirty="0"/>
-          </a:p>
-          <a:p>
-            <a:r>
-              <a:rPr lang="en-US" i="1" dirty="0">
-                <a:latin typeface="Calibri" panose="020F0502020204030204" pitchFamily="34" charset="0"/>
-                <a:cs typeface="Calibri" panose="020F0502020204030204" pitchFamily="34" charset="0"/>
-              </a:rPr>
-              <a:t>The distribution bar chart concentrated on Age dimension is skewed to the left. This skewedness means that most of our patients were of age 50 + with an average age of 63. </a:t>
-            </a:r>
-          </a:p>
-          <a:p>
-            <a:r>
-              <a:rPr lang="en-US" i="1" dirty="0">
-                <a:latin typeface="Calibri" panose="020F0502020204030204" pitchFamily="34" charset="0"/>
-                <a:cs typeface="Calibri" panose="020F0502020204030204" pitchFamily="34" charset="0"/>
-              </a:rPr>
-              <a:t>At the same time this chart also displays that we had two pediatrics patients with the age bracket of 11 months to 18 years of age. </a:t>
-            </a:r>
           </a:p>
         </p:txBody>
       </p:sp>
@@ -1565,7 +1661,7 @@
           <a:p>
             <a:fld id="{E2B2A73B-86D2-4CA9-B04D-BA507D4C2C8C}" type="slidenum">
               <a:rPr lang="en-US" smtClean="0"/>
-              <a:t>15</a:t>
+              <a:t>14</a:t>
             </a:fld>
             <a:endParaRPr lang="en-US"/>
           </a:p>
@@ -1574,7 +1670,7 @@
     </p:spTree>
     <p:extLst>
       <p:ext uri="{BB962C8B-B14F-4D97-AF65-F5344CB8AC3E}">
-        <p14:creationId xmlns:p14="http://schemas.microsoft.com/office/powerpoint/2010/main" val="2909451634"/>
+        <p14:creationId xmlns:p14="http://schemas.microsoft.com/office/powerpoint/2010/main" val="76338607"/>
       </p:ext>
     </p:extLst>
   </p:cSld>
@@ -1628,9 +1724,24 @@
           <a:bodyPr/>
           <a:lstStyle/>
           <a:p>
-            <a:r>
-              <a:rPr lang="en-US" dirty="0"/>
-              <a:t>This chart shows us that number of days a patient stayed in the hospital. Looking at the first bar from the left, we can conclude that majority of our patients who tested positive were discharged the same day and must have had mild symptoms of Covid-19. Such patients were advised to self quarantine and follow ups were made by clinical staff on regular bases. At the same time we had patients who stayed for more the two months due to high acuity of their illness. </a:t>
+            <a:endParaRPr lang="en-US" dirty="0"/>
+          </a:p>
+          <a:p>
+            <a:r>
+              <a:rPr lang="en-US" i="1" dirty="0">
+                <a:latin typeface="Calibri" panose="020F0502020204030204" pitchFamily="34" charset="0"/>
+                <a:cs typeface="Calibri" panose="020F0502020204030204" pitchFamily="34" charset="0"/>
+              </a:rPr>
+              <a:t>The distribution bar chart concentrated on Age dimension is skewed to the left. This skewedness means that most of our patients were of age 50 + with an average age of 63. </a:t>
+            </a:r>
+          </a:p>
+          <a:p>
+            <a:r>
+              <a:rPr lang="en-US" i="1" dirty="0">
+                <a:latin typeface="Calibri" panose="020F0502020204030204" pitchFamily="34" charset="0"/>
+                <a:cs typeface="Calibri" panose="020F0502020204030204" pitchFamily="34" charset="0"/>
+              </a:rPr>
+              <a:t>At the same time this chart also displays that we had two pediatrics patients with the age bracket of 11 months to 18 years of age. </a:t>
             </a:r>
           </a:p>
         </p:txBody>
@@ -1652,7 +1763,7 @@
           <a:p>
             <a:fld id="{E2B2A73B-86D2-4CA9-B04D-BA507D4C2C8C}" type="slidenum">
               <a:rPr lang="en-US" smtClean="0"/>
-              <a:t>17</a:t>
+              <a:t>15</a:t>
             </a:fld>
             <a:endParaRPr lang="en-US"/>
           </a:p>
@@ -1661,7 +1772,7 @@
     </p:spTree>
     <p:extLst>
       <p:ext uri="{BB962C8B-B14F-4D97-AF65-F5344CB8AC3E}">
-        <p14:creationId xmlns:p14="http://schemas.microsoft.com/office/powerpoint/2010/main" val="3727277132"/>
+        <p14:creationId xmlns:p14="http://schemas.microsoft.com/office/powerpoint/2010/main" val="2909451634"/>
       </p:ext>
     </p:extLst>
   </p:cSld>
@@ -1715,65 +1826,10 @@
           <a:bodyPr/>
           <a:lstStyle/>
           <a:p>
-            <a:pPr marL="0" marR="0" lvl="0" indent="0" algn="l" defTabSz="914400" rtl="0" eaLnBrk="1" fontAlgn="auto" latinLnBrk="0" hangingPunct="1">
-              <a:lnSpc>
-                <a:spcPct val="100000"/>
-              </a:lnSpc>
-              <a:spcBef>
-                <a:spcPts val="0"/>
-              </a:spcBef>
-              <a:spcAft>
-                <a:spcPts val="0"/>
-              </a:spcAft>
-              <a:buClrTx/>
-              <a:buSzTx/>
-              <a:buFontTx/>
-              <a:buNone/>
-              <a:tabLst/>
-              <a:defRPr/>
-            </a:pPr>
-            <a:r>
-              <a:rPr lang="en-US" sz="1200" i="1" kern="1200" dirty="0">
-                <a:solidFill>
-                  <a:schemeClr val="tx1"/>
-                </a:solidFill>
-                <a:latin typeface="Calibri" panose="020F0502020204030204" pitchFamily="34" charset="0"/>
-                <a:ea typeface="+mn-ea"/>
-                <a:cs typeface="Calibri" panose="020F0502020204030204" pitchFamily="34" charset="0"/>
-              </a:rPr>
-              <a:t>A boxplot is a graph that gives you a good indication of how the values in the dataset are spread out. The interquartile range is a measure of variability, based on dividing a data set into quartiles. It contains the middle 50% of a distribution and is a robust measure of statistical dispersion. It can also be used to find outliers in data.</a:t>
-            </a:r>
-          </a:p>
-          <a:p>
-            <a:pPr marL="0" marR="0" lvl="0" indent="0" algn="l" defTabSz="914400" rtl="0" eaLnBrk="1" fontAlgn="auto" latinLnBrk="0" hangingPunct="1">
-              <a:lnSpc>
-                <a:spcPct val="100000"/>
-              </a:lnSpc>
-              <a:spcBef>
-                <a:spcPts val="0"/>
-              </a:spcBef>
-              <a:spcAft>
-                <a:spcPts val="0"/>
-              </a:spcAft>
-              <a:buClrTx/>
-              <a:buSzTx/>
-              <a:buFontTx/>
-              <a:buNone/>
-              <a:tabLst/>
-              <a:defRPr/>
-            </a:pPr>
-            <a:r>
-              <a:rPr lang="en-US" sz="1200" i="1" kern="1200" dirty="0">
-                <a:solidFill>
-                  <a:schemeClr val="tx1"/>
-                </a:solidFill>
-                <a:latin typeface="Calibri" panose="020F0502020204030204" pitchFamily="34" charset="0"/>
-                <a:ea typeface="+mn-ea"/>
-                <a:cs typeface="Calibri" panose="020F0502020204030204" pitchFamily="34" charset="0"/>
-              </a:rPr>
-              <a:t>The highest number of cases were reported on the 1st of April with the total of 37 cases. The median is around 17, separating the higher half from the lower half of our dataset.</a:t>
-            </a:r>
-            <a:endParaRPr lang="en-US" dirty="0"/>
+            <a:r>
+              <a:rPr lang="en-US" dirty="0"/>
+              <a:t>This chart shows us that number of days a patient stayed in the hospital. Looking at the first bar from the left, we can conclude that majority of our patients who tested positive were discharged the same day and must have had mild symptoms of Covid-19. Such patients were advised to self quarantine and follow ups were made by clinical staff on regular bases. At the same time we had patients who stayed for more the two months due to high acuity of their illness. </a:t>
+            </a:r>
           </a:p>
         </p:txBody>
       </p:sp>
@@ -1794,7 +1850,7 @@
           <a:p>
             <a:fld id="{E2B2A73B-86D2-4CA9-B04D-BA507D4C2C8C}" type="slidenum">
               <a:rPr lang="en-US" smtClean="0"/>
-              <a:t>18</a:t>
+              <a:t>17</a:t>
             </a:fld>
             <a:endParaRPr lang="en-US"/>
           </a:p>
@@ -1803,7 +1859,7 @@
     </p:spTree>
     <p:extLst>
       <p:ext uri="{BB962C8B-B14F-4D97-AF65-F5344CB8AC3E}">
-        <p14:creationId xmlns:p14="http://schemas.microsoft.com/office/powerpoint/2010/main" val="12559377"/>
+        <p14:creationId xmlns:p14="http://schemas.microsoft.com/office/powerpoint/2010/main" val="3727277132"/>
       </p:ext>
     </p:extLst>
   </p:cSld>
@@ -1857,6 +1913,64 @@
           <a:bodyPr/>
           <a:lstStyle/>
           <a:p>
+            <a:pPr marL="0" marR="0" lvl="0" indent="0" algn="l" defTabSz="914400" rtl="0" eaLnBrk="1" fontAlgn="auto" latinLnBrk="0" hangingPunct="1">
+              <a:lnSpc>
+                <a:spcPct val="100000"/>
+              </a:lnSpc>
+              <a:spcBef>
+                <a:spcPts val="0"/>
+              </a:spcBef>
+              <a:spcAft>
+                <a:spcPts val="0"/>
+              </a:spcAft>
+              <a:buClrTx/>
+              <a:buSzTx/>
+              <a:buFontTx/>
+              <a:buNone/>
+              <a:tabLst/>
+              <a:defRPr/>
+            </a:pPr>
+            <a:r>
+              <a:rPr lang="en-US" sz="1200" i="1" kern="1200" dirty="0">
+                <a:solidFill>
+                  <a:schemeClr val="tx1"/>
+                </a:solidFill>
+                <a:latin typeface="Calibri" panose="020F0502020204030204" pitchFamily="34" charset="0"/>
+                <a:ea typeface="+mn-ea"/>
+                <a:cs typeface="Calibri" panose="020F0502020204030204" pitchFamily="34" charset="0"/>
+              </a:rPr>
+              <a:t>A boxplot is a graph that gives you a good indication of how the values in the dataset are spread out. The interquartile range is a measure of variability, based on dividing a data set into quartiles. It contains the middle 50% of a distribution and is a robust measure of statistical dispersion. It can also be used to find outliers in data.</a:t>
+            </a:r>
+          </a:p>
+          <a:p>
+            <a:pPr marL="0" marR="0" lvl="0" indent="0" algn="l" defTabSz="914400" rtl="0" eaLnBrk="1" fontAlgn="auto" latinLnBrk="0" hangingPunct="1">
+              <a:lnSpc>
+                <a:spcPct val="100000"/>
+              </a:lnSpc>
+              <a:spcBef>
+                <a:spcPts val="0"/>
+              </a:spcBef>
+              <a:spcAft>
+                <a:spcPts val="0"/>
+              </a:spcAft>
+              <a:buClrTx/>
+              <a:buSzTx/>
+              <a:buFontTx/>
+              <a:buNone/>
+              <a:tabLst/>
+              <a:defRPr/>
+            </a:pPr>
+            <a:r>
+              <a:rPr lang="en-US" sz="1200" i="1" kern="1200" dirty="0">
+                <a:solidFill>
+                  <a:schemeClr val="tx1"/>
+                </a:solidFill>
+                <a:latin typeface="Calibri" panose="020F0502020204030204" pitchFamily="34" charset="0"/>
+                <a:ea typeface="+mn-ea"/>
+                <a:cs typeface="Calibri" panose="020F0502020204030204" pitchFamily="34" charset="0"/>
+              </a:rPr>
+              <a:t>The highest number of cases were reported on the 1st of April with the total of 37 cases. The median is around 17, separating the higher half from the lower half of our dataset.</a:t>
+            </a:r>
             <a:endParaRPr lang="en-US" dirty="0"/>
           </a:p>
         </p:txBody>
@@ -1878,7 +1992,7 @@
           <a:p>
             <a:fld id="{E2B2A73B-86D2-4CA9-B04D-BA507D4C2C8C}" type="slidenum">
               <a:rPr lang="en-US" smtClean="0"/>
-              <a:t>19</a:t>
+              <a:t>18</a:t>
             </a:fld>
             <a:endParaRPr lang="en-US"/>
           </a:p>
@@ -1887,7 +2001,7 @@
     </p:spTree>
     <p:extLst>
       <p:ext uri="{BB962C8B-B14F-4D97-AF65-F5344CB8AC3E}">
-        <p14:creationId xmlns:p14="http://schemas.microsoft.com/office/powerpoint/2010/main" val="2572652875"/>
+        <p14:creationId xmlns:p14="http://schemas.microsoft.com/office/powerpoint/2010/main" val="12559377"/>
       </p:ext>
     </p:extLst>
   </p:cSld>
@@ -1941,10 +2055,7 @@
           <a:bodyPr/>
           <a:lstStyle/>
           <a:p>
-            <a:r>
-              <a:rPr lang="en-US" dirty="0"/>
-              <a:t>Grace</a:t>
-            </a:r>
+            <a:endParaRPr lang="en-US" dirty="0"/>
           </a:p>
         </p:txBody>
       </p:sp>
@@ -1965,7 +2076,7 @@
           <a:p>
             <a:fld id="{E2B2A73B-86D2-4CA9-B04D-BA507D4C2C8C}" type="slidenum">
               <a:rPr lang="en-US" smtClean="0"/>
-              <a:t>21</a:t>
+              <a:t>19</a:t>
             </a:fld>
             <a:endParaRPr lang="en-US"/>
           </a:p>
@@ -1974,7 +2085,7 @@
     </p:spTree>
     <p:extLst>
       <p:ext uri="{BB962C8B-B14F-4D97-AF65-F5344CB8AC3E}">
-        <p14:creationId xmlns:p14="http://schemas.microsoft.com/office/powerpoint/2010/main" val="2009066719"/>
+        <p14:creationId xmlns:p14="http://schemas.microsoft.com/office/powerpoint/2010/main" val="2572652875"/>
       </p:ext>
     </p:extLst>
   </p:cSld>
@@ -7597,6 +7708,50 @@
       </p:grpSpPr>
       <p:sp>
         <p:nvSpPr>
+          <p:cNvPr id="3" name="Rectangle 2">
+            <a:extLst>
+              <a:ext uri="{FF2B5EF4-FFF2-40B4-BE49-F238E27FC236}">
+                <a16:creationId xmlns:a16="http://schemas.microsoft.com/office/drawing/2014/main" id="{EC10A166-7DAE-47B5-84DB-F62BF00682A4}"/>
+              </a:ext>
+            </a:extLst>
+          </p:cNvPr>
+          <p:cNvSpPr/>
+          <p:nvPr/>
+        </p:nvSpPr>
+        <p:spPr>
+          <a:xfrm>
+            <a:off x="490888" y="576989"/>
+            <a:ext cx="1711691" cy="1245214"/>
+          </a:xfrm>
+          <a:prstGeom prst="rect">
+            <a:avLst/>
+          </a:prstGeom>
+        </p:spPr>
+        <p:style>
+          <a:lnRef idx="2">
+            <a:schemeClr val="dk1"/>
+          </a:lnRef>
+          <a:fillRef idx="1">
+            <a:schemeClr val="lt1"/>
+          </a:fillRef>
+          <a:effectRef idx="0">
+            <a:schemeClr val="dk1"/>
+          </a:effectRef>
+          <a:fontRef idx="minor">
+            <a:schemeClr val="dk1"/>
+          </a:fontRef>
+        </p:style>
+        <p:txBody>
+          <a:bodyPr rtlCol="0" anchor="ctr"/>
+          <a:lstStyle/>
+          <a:p>
+            <a:pPr algn="ctr"/>
+            <a:endParaRPr lang="en-US"/>
+          </a:p>
+        </p:txBody>
+      </p:sp>
+      <p:sp>
+        <p:nvSpPr>
           <p:cNvPr id="73" name="Freeform: Shape 72">
             <a:extLst>
               <a:ext uri="{FF2B5EF4-FFF2-40B4-BE49-F238E27FC236}">
@@ -8868,8 +9023,8 @@
         </p:blipFill>
         <p:spPr>
           <a:xfrm>
-            <a:off x="5425579" y="1368193"/>
-            <a:ext cx="1816564" cy="906848"/>
+            <a:off x="5425579" y="1257432"/>
+            <a:ext cx="1816564" cy="1168134"/>
           </a:xfrm>
           <a:prstGeom prst="rect">
             <a:avLst/>
@@ -9006,8 +9161,8 @@
         </p:blipFill>
         <p:spPr>
           <a:xfrm>
-            <a:off x="376509" y="533121"/>
-            <a:ext cx="2091138" cy="1525647"/>
+            <a:off x="692901" y="684709"/>
+            <a:ext cx="1091665" cy="796454"/>
           </a:xfrm>
           <a:prstGeom prst="rect">
             <a:avLst/>
@@ -9036,8 +9191,8 @@
         </p:blipFill>
         <p:spPr>
           <a:xfrm>
-            <a:off x="4222496" y="3421209"/>
-            <a:ext cx="3148072" cy="1407142"/>
+            <a:off x="4223796" y="3190635"/>
+            <a:ext cx="3148072" cy="1838075"/>
           </a:xfrm>
           <a:prstGeom prst="rect">
             <a:avLst/>
@@ -9266,8 +9421,8 @@
         </p:blipFill>
         <p:spPr>
           <a:xfrm>
-            <a:off x="3187313" y="1077729"/>
-            <a:ext cx="1622498" cy="1186196"/>
+            <a:off x="3078067" y="975142"/>
+            <a:ext cx="1816590" cy="1495635"/>
           </a:xfrm>
           <a:prstGeom prst="rect">
             <a:avLst/>
@@ -9296,8 +9451,8 @@
         </p:blipFill>
         <p:spPr>
           <a:xfrm>
-            <a:off x="7769364" y="2170271"/>
-            <a:ext cx="3747777" cy="2273581"/>
+            <a:off x="7769364" y="1484471"/>
+            <a:ext cx="3747777" cy="3889058"/>
           </a:xfrm>
           <a:prstGeom prst="rect">
             <a:avLst/>
@@ -9326,14 +9481,79 @@
         </p:blipFill>
         <p:spPr>
           <a:xfrm>
-            <a:off x="553414" y="3883586"/>
-            <a:ext cx="2472556" cy="1298698"/>
+            <a:off x="757226" y="3858768"/>
+            <a:ext cx="2116966" cy="1348334"/>
           </a:xfrm>
           <a:prstGeom prst="rect">
             <a:avLst/>
           </a:prstGeom>
         </p:spPr>
       </p:pic>
+      <p:sp>
+        <p:nvSpPr>
+          <p:cNvPr id="2" name="Rectangle 1">
+            <a:extLst>
+              <a:ext uri="{FF2B5EF4-FFF2-40B4-BE49-F238E27FC236}">
+                <a16:creationId xmlns:a16="http://schemas.microsoft.com/office/drawing/2014/main" id="{AA903CEE-DB60-4C83-B756-E9C85C163EE3}"/>
+              </a:ext>
+            </a:extLst>
+          </p:cNvPr>
+          <p:cNvSpPr/>
+          <p:nvPr/>
+        </p:nvSpPr>
+        <p:spPr>
+          <a:xfrm>
+            <a:off x="2978331" y="5547923"/>
+            <a:ext cx="4706738" cy="830997"/>
+          </a:xfrm>
+          <a:prstGeom prst="rect">
+            <a:avLst/>
+          </a:prstGeom>
+          <a:noFill/>
+        </p:spPr>
+        <p:txBody>
+          <a:bodyPr wrap="none" lIns="91440" tIns="45720" rIns="91440" bIns="45720">
+            <a:spAutoFit/>
+          </a:bodyPr>
+          <a:lstStyle/>
+          <a:p>
+            <a:pPr algn="ctr"/>
+            <a:r>
+              <a:rPr lang="en-US" sz="4800" b="0" cap="none" spc="0" dirty="0">
+                <a:ln w="0"/>
+                <a:solidFill>
+                  <a:schemeClr val="tx1"/>
+                </a:solidFill>
+                <a:effectLst>
+                  <a:outerShdw blurRad="38100" dist="19050" dir="2700000" algn="tl" rotWithShape="0">
+                    <a:schemeClr val="dk1">
+                      <a:alpha val="40000"/>
+                    </a:schemeClr>
+                  </a:outerShdw>
+                </a:effectLst>
+                <a:latin typeface="Aharoni" panose="020B0604020202020204" pitchFamily="2" charset="-79"/>
+                <a:cs typeface="Aharoni" panose="020B0604020202020204" pitchFamily="2" charset="-79"/>
+              </a:rPr>
+              <a:t>INFOGRAPHICS</a:t>
+            </a:r>
+            <a:endParaRPr lang="en-US" sz="5400" b="0" cap="none" spc="0" dirty="0">
+              <a:ln w="0"/>
+              <a:solidFill>
+                <a:schemeClr val="tx1"/>
+              </a:solidFill>
+              <a:effectLst>
+                <a:outerShdw blurRad="38100" dist="19050" dir="2700000" algn="tl" rotWithShape="0">
+                  <a:schemeClr val="dk1">
+                    <a:alpha val="40000"/>
+                  </a:schemeClr>
+                </a:outerShdw>
+              </a:effectLst>
+              <a:latin typeface="Aharoni" panose="020B0604020202020204" pitchFamily="2" charset="-79"/>
+              <a:cs typeface="Aharoni" panose="020B0604020202020204" pitchFamily="2" charset="-79"/>
+            </a:endParaRPr>
+          </a:p>
+        </p:txBody>
+      </p:sp>
     </p:spTree>
     <p:extLst>
       <p:ext uri="{BB962C8B-B14F-4D97-AF65-F5344CB8AC3E}">
@@ -11246,7 +11466,7 @@
         <p:spPr>
           <a:xfrm>
             <a:off x="8185922" y="4014298"/>
-            <a:ext cx="3383280" cy="2554545"/>
+            <a:ext cx="3383280" cy="1323439"/>
           </a:xfrm>
           <a:prstGeom prst="rect">
             <a:avLst/>
@@ -11260,7 +11480,7 @@
           <a:lstStyle/>
           <a:p>
             <a:r>
-              <a:rPr lang="en-US" sz="3200" i="1" dirty="0">
+              <a:rPr lang="en-US" sz="2000" i="1" dirty="0">
                 <a:solidFill>
                   <a:schemeClr val="bg1"/>
                 </a:solidFill>
@@ -11586,7 +11806,7 @@
           <a:lstStyle/>
           <a:p>
             <a:r>
-              <a:rPr lang="en-US" sz="4400" dirty="0"/>
+              <a:rPr lang="en-US" sz="5400" dirty="0"/>
               <a:t>BOX PLOT</a:t>
             </a:r>
           </a:p>
@@ -13048,7 +13268,14 @@
           <a:p>
             <a:r>
               <a:rPr lang="en-US" sz="4400" dirty="0"/>
-              <a:t>Scatter Plot</a:t>
+              <a:t>SCATTER</a:t>
+            </a:r>
+            <a:br>
+              <a:rPr lang="en-US" sz="4400" dirty="0"/>
+            </a:br>
+            <a:r>
+              <a:rPr lang="en-US" sz="4400" dirty="0"/>
+              <a:t>PLOT</a:t>
             </a:r>
           </a:p>
         </p:txBody>
@@ -13175,23 +13402,7 @@
                   <a:schemeClr val="bg1"/>
                 </a:solidFill>
               </a:rPr>
-              <a:t>Total # of </a:t>
-            </a:r>
-            <a:r>
-              <a:rPr lang="en-US" sz="3200" i="1" dirty="0" err="1">
-                <a:solidFill>
-                  <a:schemeClr val="bg1"/>
-                </a:solidFill>
-              </a:rPr>
-              <a:t>Covid</a:t>
-            </a:r>
-            <a:r>
-              <a:rPr lang="en-US" sz="3200" i="1" dirty="0">
-                <a:solidFill>
-                  <a:schemeClr val="bg1"/>
-                </a:solidFill>
-              </a:rPr>
-              <a:t> cases by Specimen type and by month</a:t>
+              <a:t>Total # of COVID-19 cases by Specimen type and by month</a:t>
             </a:r>
           </a:p>
         </p:txBody>
@@ -13251,7 +13462,14 @@
           <a:p>
             <a:r>
               <a:rPr lang="en-US" sz="4400" dirty="0"/>
-              <a:t>Scatter Plot</a:t>
+              <a:t>SCATTER</a:t>
+            </a:r>
+            <a:br>
+              <a:rPr lang="en-US" sz="4400" dirty="0"/>
+            </a:br>
+            <a:r>
+              <a:rPr lang="en-US" sz="4400" dirty="0"/>
+              <a:t>PLOT</a:t>
             </a:r>
           </a:p>
         </p:txBody>
@@ -13294,23 +13512,7 @@
                   <a:schemeClr val="bg1"/>
                 </a:solidFill>
               </a:rPr>
-              <a:t>Total # of </a:t>
-            </a:r>
-            <a:r>
-              <a:rPr lang="en-US" sz="3200" i="1" dirty="0" err="1">
-                <a:solidFill>
-                  <a:schemeClr val="bg1"/>
-                </a:solidFill>
-              </a:rPr>
-              <a:t>Covid</a:t>
-            </a:r>
-            <a:r>
-              <a:rPr lang="en-US" sz="3200" i="1" dirty="0">
-                <a:solidFill>
-                  <a:schemeClr val="bg1"/>
-                </a:solidFill>
-              </a:rPr>
-              <a:t> test processed by each Lab </a:t>
+              <a:t>Total # of COVID-19 test processed by each Lab </a:t>
             </a:r>
           </a:p>
         </p:txBody>
@@ -13399,8 +13601,15 @@
           <a:lstStyle/>
           <a:p>
             <a:r>
-              <a:rPr lang="en-US" sz="4400" dirty="0"/>
-              <a:t>Scatter Plot</a:t>
+              <a:rPr lang="en-US" sz="4800" dirty="0"/>
+              <a:t>SCATTER</a:t>
+            </a:r>
+            <a:br>
+              <a:rPr lang="en-US" sz="4800" dirty="0"/>
+            </a:br>
+            <a:r>
+              <a:rPr lang="en-US" sz="4800" dirty="0"/>
+              <a:t>PLOT</a:t>
             </a:r>
           </a:p>
         </p:txBody>
@@ -13424,7 +13633,7 @@
         <p:spPr>
           <a:xfrm>
             <a:off x="642938" y="3043238"/>
-            <a:ext cx="3517900" cy="2218043"/>
+            <a:ext cx="3517900" cy="2020040"/>
           </a:xfrm>
           <a:prstGeom prst="rect">
             <a:avLst/>
@@ -13438,28 +13647,12 @@
           <a:lstStyle/>
           <a:p>
             <a:r>
-              <a:rPr lang="en-US" sz="3200" i="1" dirty="0">
+              <a:rPr lang="en-US" sz="2800" i="1" dirty="0">
                 <a:solidFill>
                   <a:schemeClr val="bg1"/>
                 </a:solidFill>
               </a:rPr>
-              <a:t>Total # of days for Labs to process the </a:t>
-            </a:r>
-            <a:r>
-              <a:rPr lang="en-US" sz="3200" i="1" dirty="0" err="1">
-                <a:solidFill>
-                  <a:schemeClr val="bg1"/>
-                </a:solidFill>
-              </a:rPr>
-              <a:t>Covid</a:t>
-            </a:r>
-            <a:r>
-              <a:rPr lang="en-US" sz="3200" i="1" dirty="0">
-                <a:solidFill>
-                  <a:schemeClr val="bg1"/>
-                </a:solidFill>
-              </a:rPr>
-              <a:t> test for each patient</a:t>
+              <a:t>Total # of days for Labs to process the COVID-19 test for each patient</a:t>
             </a:r>
           </a:p>
         </p:txBody>
@@ -13548,8 +13741,15 @@
           <a:lstStyle/>
           <a:p>
             <a:r>
-              <a:rPr lang="en-US" sz="4400" dirty="0"/>
-              <a:t>Box Plot</a:t>
+              <a:rPr lang="en-US" sz="4800" dirty="0"/>
+              <a:t>BOX</a:t>
+            </a:r>
+            <a:br>
+              <a:rPr lang="en-US" sz="4800" dirty="0"/>
+            </a:br>
+            <a:r>
+              <a:rPr lang="en-US" sz="4800" dirty="0"/>
+              <a:t>PLOT</a:t>
             </a:r>
           </a:p>
         </p:txBody>
@@ -13573,7 +13773,7 @@
         <p:spPr>
           <a:xfrm>
             <a:off x="642938" y="3043238"/>
-            <a:ext cx="3517900" cy="2218043"/>
+            <a:ext cx="3517900" cy="1952329"/>
           </a:xfrm>
           <a:prstGeom prst="rect">
             <a:avLst/>
@@ -13587,28 +13787,12 @@
           <a:lstStyle/>
           <a:p>
             <a:r>
-              <a:rPr lang="en-US" sz="3200" i="1" dirty="0">
+              <a:rPr lang="en-US" sz="2800" i="1" dirty="0">
                 <a:solidFill>
                   <a:schemeClr val="bg1"/>
                 </a:solidFill>
               </a:rPr>
-              <a:t>Total # of days for Labs to process the </a:t>
-            </a:r>
-            <a:r>
-              <a:rPr lang="en-US" sz="3200" i="1" dirty="0" err="1">
-                <a:solidFill>
-                  <a:schemeClr val="bg1"/>
-                </a:solidFill>
-              </a:rPr>
-              <a:t>Covid</a:t>
-            </a:r>
-            <a:r>
-              <a:rPr lang="en-US" sz="3200" i="1" dirty="0">
-                <a:solidFill>
-                  <a:schemeClr val="bg1"/>
-                </a:solidFill>
-              </a:rPr>
-              <a:t> test for each patient</a:t>
+              <a:t>Total # of days for Labs to process the COVID-19 test for each patient</a:t>
             </a:r>
           </a:p>
         </p:txBody>
@@ -13698,7 +13882,14 @@
           <a:p>
             <a:r>
               <a:rPr lang="en-US" sz="4400" dirty="0"/>
-              <a:t>Scatter Plot</a:t>
+              <a:t>SCATTER </a:t>
+            </a:r>
+            <a:br>
+              <a:rPr lang="en-US" sz="4400" dirty="0"/>
+            </a:br>
+            <a:r>
+              <a:rPr lang="en-US" sz="4400" dirty="0"/>
+              <a:t>PLOT</a:t>
             </a:r>
           </a:p>
         </p:txBody>
@@ -14209,7 +14400,7 @@
         <p:spPr>
           <a:xfrm>
             <a:off x="7997591" y="3874576"/>
-            <a:ext cx="3659246" cy="2877711"/>
+            <a:ext cx="3659246" cy="2539157"/>
           </a:xfrm>
           <a:prstGeom prst="rect">
             <a:avLst/>
@@ -14228,15 +14419,15 @@
               </a:spcAft>
             </a:pPr>
             <a:r>
-              <a:rPr lang="en-US" sz="2400" b="0" dirty="0">
+              <a:rPr lang="en-US" sz="2000" b="0" dirty="0">
                 <a:solidFill>
                   <a:srgbClr val="6AA94F"/>
                 </a:solidFill>
                 <a:effectLst/>
-                <a:latin typeface="Caveat" panose="00000500000000000000" pitchFamily="2" charset="0"/>
+                <a:latin typeface="Arial" panose="020B0604020202020204" pitchFamily="34" charset="0"/>
                 <a:cs typeface="Arial" panose="020B0604020202020204" pitchFamily="34" charset="0"/>
               </a:rPr>
-              <a:t>Correlation between age, gender and Service line</a:t>
+              <a:t>Correlation between age, gender and service line</a:t>
             </a:r>
           </a:p>
           <a:p>
@@ -14246,14 +14437,14 @@
               </a:spcAft>
             </a:pPr>
             <a:r>
-              <a:rPr lang="en-US" sz="1400" dirty="0">
+              <a:rPr lang="en-US" sz="1200" dirty="0">
                 <a:solidFill>
                   <a:srgbClr val="6AA94F"/>
                 </a:solidFill>
-                <a:latin typeface="Caveat" panose="00000500000000000000" pitchFamily="2" charset="0"/>
+                <a:latin typeface="Arial" panose="020B0604020202020204" pitchFamily="34" charset="0"/>
                 <a:cs typeface="Arial" panose="020B0604020202020204" pitchFamily="34" charset="0"/>
               </a:rPr>
-              <a:t>Medicine     122                       Pediatric         129  </a:t>
+              <a:t>Medicine       122                     Pediatric         129  </a:t>
             </a:r>
           </a:p>
           <a:p>
@@ -14263,14 +14454,14 @@
               </a:spcAft>
             </a:pPr>
             <a:r>
-              <a:rPr lang="en-US" sz="1400" dirty="0">
+              <a:rPr lang="en-US" sz="1200" dirty="0">
                 <a:solidFill>
                   <a:srgbClr val="6AA94F"/>
                 </a:solidFill>
-                <a:latin typeface="Caveat" panose="00000500000000000000" pitchFamily="2" charset="0"/>
+                <a:latin typeface="Arial" panose="020B0604020202020204" pitchFamily="34" charset="0"/>
                 <a:cs typeface="Arial" panose="020B0604020202020204" pitchFamily="34" charset="0"/>
               </a:rPr>
-              <a:t>Emergency  123                       Urology           130</a:t>
+              <a:t>Emergency    123                    Urology           130</a:t>
             </a:r>
           </a:p>
           <a:p>
@@ -14280,14 +14471,14 @@
               </a:spcAft>
             </a:pPr>
             <a:r>
-              <a:rPr lang="en-US" sz="1400" dirty="0">
+              <a:rPr lang="en-US" sz="1200" dirty="0">
                 <a:solidFill>
                   <a:srgbClr val="6AA94F"/>
                 </a:solidFill>
-                <a:latin typeface="Caveat" panose="00000500000000000000" pitchFamily="2" charset="0"/>
+                <a:latin typeface="Arial" panose="020B0604020202020204" pitchFamily="34" charset="0"/>
                 <a:cs typeface="Arial" panose="020B0604020202020204" pitchFamily="34" charset="0"/>
               </a:rPr>
-              <a:t>Surgery        124                        Plastic             131</a:t>
+              <a:t>Surgery          124                    Plastic             131</a:t>
             </a:r>
           </a:p>
           <a:p>
@@ -14297,34 +14488,34 @@
               </a:spcAft>
             </a:pPr>
             <a:r>
-              <a:rPr lang="en-US" sz="1400" dirty="0">
+              <a:rPr lang="en-US" sz="1200" dirty="0">
                 <a:solidFill>
                   <a:srgbClr val="6AA94F"/>
                 </a:solidFill>
-                <a:latin typeface="Caveat" panose="00000500000000000000" pitchFamily="2" charset="0"/>
+                <a:latin typeface="Arial" panose="020B0604020202020204" pitchFamily="34" charset="0"/>
                 <a:cs typeface="Arial" panose="020B0604020202020204" pitchFamily="34" charset="0"/>
               </a:rPr>
-              <a:t>SICU              125                        Ext </a:t>
-            </a:r>
-            <a:r>
-              <a:rPr lang="en-US" sz="1400" dirty="0" err="1">
+              <a:t>SICU              125                    Ext </a:t>
+            </a:r>
+            <a:r>
+              <a:rPr lang="en-US" sz="1200" dirty="0" err="1">
                 <a:solidFill>
                   <a:srgbClr val="6AA94F"/>
                 </a:solidFill>
-                <a:latin typeface="Caveat" panose="00000500000000000000" pitchFamily="2" charset="0"/>
+                <a:latin typeface="Arial" panose="020B0604020202020204" pitchFamily="34" charset="0"/>
                 <a:cs typeface="Arial" panose="020B0604020202020204" pitchFamily="34" charset="0"/>
               </a:rPr>
               <a:t>Obs</a:t>
             </a:r>
             <a:r>
-              <a:rPr lang="en-US" sz="1400" dirty="0">
+              <a:rPr lang="en-US" sz="1200" dirty="0">
                 <a:solidFill>
                   <a:srgbClr val="6AA94F"/>
                 </a:solidFill>
-                <a:latin typeface="Caveat" panose="00000500000000000000" pitchFamily="2" charset="0"/>
+                <a:latin typeface="Arial" panose="020B0604020202020204" pitchFamily="34" charset="0"/>
                 <a:cs typeface="Arial" panose="020B0604020202020204" pitchFamily="34" charset="0"/>
               </a:rPr>
-              <a:t>           133</a:t>
+              <a:t>          133</a:t>
             </a:r>
           </a:p>
           <a:p>
@@ -14334,12 +14525,12 @@
               </a:spcAft>
             </a:pPr>
             <a:r>
-              <a:rPr lang="en-US" sz="1400" b="0" dirty="0">
+              <a:rPr lang="en-US" sz="1200" b="0" dirty="0">
                 <a:solidFill>
                   <a:srgbClr val="6AA94F"/>
                 </a:solidFill>
                 <a:effectLst/>
-                <a:latin typeface="Caveat" panose="00000500000000000000" pitchFamily="2" charset="0"/>
+                <a:latin typeface="Arial" panose="020B0604020202020204" pitchFamily="34" charset="0"/>
                 <a:cs typeface="Arial" panose="020B0604020202020204" pitchFamily="34" charset="0"/>
               </a:rPr>
               <a:t>OB                 126</a:t>
@@ -14352,11 +14543,11 @@
               </a:spcAft>
             </a:pPr>
             <a:r>
-              <a:rPr lang="en-US" sz="1400" dirty="0">
+              <a:rPr lang="en-US" sz="1200" dirty="0">
                 <a:solidFill>
                   <a:srgbClr val="6AA94F"/>
                 </a:solidFill>
-                <a:latin typeface="Caveat" panose="00000500000000000000" pitchFamily="2" charset="0"/>
+                <a:latin typeface="Arial" panose="020B0604020202020204" pitchFamily="34" charset="0"/>
                 <a:cs typeface="Arial" panose="020B0604020202020204" pitchFamily="34" charset="0"/>
               </a:rPr>
               <a:t>CCU               127</a:t>
@@ -14369,12 +14560,12 @@
               </a:spcAft>
             </a:pPr>
             <a:r>
-              <a:rPr lang="en-US" sz="1400" b="0" dirty="0">
+              <a:rPr lang="en-US" sz="1200" b="0" dirty="0">
                 <a:solidFill>
                   <a:srgbClr val="6AA94F"/>
                 </a:solidFill>
                 <a:effectLst/>
-                <a:latin typeface="Caveat" panose="00000500000000000000" pitchFamily="2" charset="0"/>
+                <a:latin typeface="Arial" panose="020B0604020202020204" pitchFamily="34" charset="0"/>
                 <a:cs typeface="Arial" panose="020B0604020202020204" pitchFamily="34" charset="0"/>
               </a:rPr>
               <a:t>MICU             128</a:t>
@@ -14816,8 +15007,8 @@
         </p:blipFill>
         <p:spPr>
           <a:xfrm>
-            <a:off x="314960" y="721973"/>
-            <a:ext cx="11765280" cy="5580966"/>
+            <a:off x="133350" y="721973"/>
+            <a:ext cx="11946890" cy="5580966"/>
           </a:xfrm>
           <a:prstGeom prst="rect">
             <a:avLst/>
@@ -14912,7 +15103,7 @@
         </p:nvSpPr>
         <p:spPr>
           <a:xfrm>
-            <a:off x="1527892" y="189188"/>
+            <a:off x="2308942" y="189188"/>
             <a:ext cx="8066632" cy="461665"/>
           </a:xfrm>
           <a:prstGeom prst="rect">
@@ -14965,7 +15156,7 @@
         <p:spPr>
           <a:xfrm>
             <a:off x="233680" y="737217"/>
-            <a:ext cx="11592560" cy="5551823"/>
+            <a:ext cx="11748770" cy="5551823"/>
           </a:xfrm>
           <a:prstGeom prst="rect">
             <a:avLst/>
@@ -15025,7 +15216,7 @@
           <a:p>
             <a:r>
               <a:rPr lang="en-US" dirty="0"/>
-              <a:t>Project Overview:</a:t>
+              <a:t>Overview:</a:t>
             </a:r>
           </a:p>
         </p:txBody>
@@ -15054,87 +15245,135 @@
         </p:spPr>
         <p:txBody>
           <a:bodyPr>
-            <a:normAutofit fontScale="85000" lnSpcReduction="10000"/>
+            <a:normAutofit fontScale="92500" lnSpcReduction="10000"/>
           </a:bodyPr>
           <a:lstStyle/>
           <a:p>
-            <a:pPr>
+            <a:pPr lvl="1">
+              <a:spcAft>
+                <a:spcPts val="1200"/>
+              </a:spcAft>
               <a:buFont typeface="Wingdings" panose="05000000000000000000" pitchFamily="2" charset="2"/>
-              <a:buChar char="v"/>
+              <a:buChar char="§"/>
             </a:pPr>
             <a:r>
-              <a:rPr lang="en-US" dirty="0"/>
-              <a:t> KEY STAKEHOLDERS </a:t>
-            </a:r>
-          </a:p>
-          <a:p>
-            <a:pPr>
+              <a:rPr lang="en-US" dirty="0">
+                <a:latin typeface="Arial" panose="020B0604020202020204" pitchFamily="34" charset="0"/>
+                <a:cs typeface="Arial" panose="020B0604020202020204" pitchFamily="34" charset="0"/>
+              </a:rPr>
+              <a:t> Key stakeholders </a:t>
+            </a:r>
+          </a:p>
+          <a:p>
+            <a:pPr lvl="1">
+              <a:spcAft>
+                <a:spcPts val="1200"/>
+              </a:spcAft>
               <a:buFont typeface="Wingdings" panose="05000000000000000000" pitchFamily="2" charset="2"/>
-              <a:buChar char="v"/>
+              <a:buChar char="§"/>
             </a:pPr>
             <a:r>
-              <a:rPr lang="en-US" dirty="0"/>
-              <a:t> ABOUT COVID-19</a:t>
-            </a:r>
-          </a:p>
-          <a:p>
-            <a:pPr>
+              <a:rPr lang="en-US" dirty="0">
+                <a:latin typeface="Arial" panose="020B0604020202020204" pitchFamily="34" charset="0"/>
+                <a:cs typeface="Arial" panose="020B0604020202020204" pitchFamily="34" charset="0"/>
+              </a:rPr>
+              <a:t> About COVID-19</a:t>
+            </a:r>
+          </a:p>
+          <a:p>
+            <a:pPr lvl="1">
+              <a:spcAft>
+                <a:spcPts val="1200"/>
+              </a:spcAft>
               <a:buFont typeface="Wingdings" panose="05000000000000000000" pitchFamily="2" charset="2"/>
-              <a:buChar char="v"/>
+              <a:buChar char="§"/>
             </a:pPr>
             <a:r>
-              <a:rPr lang="en-US" dirty="0"/>
-              <a:t> RESEARCH QUESTIONS</a:t>
-            </a:r>
-          </a:p>
-          <a:p>
-            <a:pPr>
+              <a:rPr lang="en-US" dirty="0">
+                <a:latin typeface="Arial" panose="020B0604020202020204" pitchFamily="34" charset="0"/>
+                <a:cs typeface="Arial" panose="020B0604020202020204" pitchFamily="34" charset="0"/>
+              </a:rPr>
+              <a:t> Research questions</a:t>
+            </a:r>
+          </a:p>
+          <a:p>
+            <a:pPr lvl="1">
+              <a:spcAft>
+                <a:spcPts val="1200"/>
+              </a:spcAft>
               <a:buFont typeface="Wingdings" panose="05000000000000000000" pitchFamily="2" charset="2"/>
-              <a:buChar char="v"/>
+              <a:buChar char="§"/>
             </a:pPr>
             <a:r>
-              <a:rPr lang="en-US" dirty="0"/>
-              <a:t> DATA GATHERING, CONNECTION AND WRANGLING</a:t>
-            </a:r>
-          </a:p>
-          <a:p>
-            <a:pPr>
+              <a:rPr lang="en-US" dirty="0">
+                <a:latin typeface="Arial" panose="020B0604020202020204" pitchFamily="34" charset="0"/>
+                <a:cs typeface="Arial" panose="020B0604020202020204" pitchFamily="34" charset="0"/>
+              </a:rPr>
+              <a:t> Data gathering, connection and wrangling</a:t>
+            </a:r>
+          </a:p>
+          <a:p>
+            <a:pPr lvl="1">
+              <a:spcAft>
+                <a:spcPts val="1200"/>
+              </a:spcAft>
               <a:buFont typeface="Wingdings" panose="05000000000000000000" pitchFamily="2" charset="2"/>
-              <a:buChar char="v"/>
+              <a:buChar char="§"/>
             </a:pPr>
             <a:r>
-              <a:rPr lang="en-US" dirty="0"/>
-              <a:t> STATS AND FINDINGS RELATED TO COVID-19</a:t>
-            </a:r>
-          </a:p>
-          <a:p>
-            <a:pPr>
+              <a:rPr lang="en-US" dirty="0">
+                <a:latin typeface="Arial" panose="020B0604020202020204" pitchFamily="34" charset="0"/>
+                <a:cs typeface="Arial" panose="020B0604020202020204" pitchFamily="34" charset="0"/>
+              </a:rPr>
+              <a:t> Stats and findings related to covid-19</a:t>
+            </a:r>
+          </a:p>
+          <a:p>
+            <a:pPr lvl="1">
+              <a:spcAft>
+                <a:spcPts val="1200"/>
+              </a:spcAft>
               <a:buFont typeface="Wingdings" panose="05000000000000000000" pitchFamily="2" charset="2"/>
-              <a:buChar char="v"/>
+              <a:buChar char="§"/>
             </a:pPr>
             <a:r>
-              <a:rPr lang="en-US" dirty="0"/>
-              <a:t> UTILIZATION IMPACT OF COVID-19 ON IP AND OP SERVICES</a:t>
-            </a:r>
-          </a:p>
-          <a:p>
-            <a:pPr>
+              <a:rPr lang="en-US" dirty="0">
+                <a:latin typeface="Arial" panose="020B0604020202020204" pitchFamily="34" charset="0"/>
+                <a:cs typeface="Arial" panose="020B0604020202020204" pitchFamily="34" charset="0"/>
+              </a:rPr>
+              <a:t> Utilization impact of COVID-19 on inpatient (IP) and outpatient (OP) services</a:t>
+            </a:r>
+          </a:p>
+          <a:p>
+            <a:pPr lvl="1">
+              <a:spcAft>
+                <a:spcPts val="1200"/>
+              </a:spcAft>
               <a:buFont typeface="Wingdings" panose="05000000000000000000" pitchFamily="2" charset="2"/>
-              <a:buChar char="v"/>
+              <a:buChar char="§"/>
             </a:pPr>
             <a:r>
-              <a:rPr lang="en-US" dirty="0"/>
-              <a:t> REVENUE IMPACT OF COVID-19 ON HOSPITAL </a:t>
-            </a:r>
-          </a:p>
-          <a:p>
-            <a:pPr>
+              <a:rPr lang="en-US" dirty="0">
+                <a:latin typeface="Arial" panose="020B0604020202020204" pitchFamily="34" charset="0"/>
+                <a:cs typeface="Arial" panose="020B0604020202020204" pitchFamily="34" charset="0"/>
+              </a:rPr>
+              <a:t> Revenue impact of COVID-19 on hospital </a:t>
+            </a:r>
+          </a:p>
+          <a:p>
+            <a:pPr lvl="1">
+              <a:spcAft>
+                <a:spcPts val="1200"/>
+              </a:spcAft>
               <a:buFont typeface="Wingdings" panose="05000000000000000000" pitchFamily="2" charset="2"/>
-              <a:buChar char="v"/>
+              <a:buChar char="§"/>
             </a:pPr>
             <a:r>
-              <a:rPr lang="en-US" dirty="0"/>
-              <a:t> CONCLUSION</a:t>
+              <a:rPr lang="en-US" dirty="0">
+                <a:latin typeface="Arial" panose="020B0604020202020204" pitchFamily="34" charset="0"/>
+                <a:cs typeface="Arial" panose="020B0604020202020204" pitchFamily="34" charset="0"/>
+              </a:rPr>
+              <a:t> Conclusion</a:t>
             </a:r>
           </a:p>
           <a:p>
@@ -16319,6 +16558,119 @@
 </p:sld>
 </file>
 
+<file path=ppt/slides/slide37.xml><?xml version="1.0" encoding="utf-8"?>
+<p:sld xmlns:a="http://schemas.openxmlformats.org/drawingml/2006/main" xmlns:r="http://schemas.openxmlformats.org/officeDocument/2006/relationships" xmlns:p="http://schemas.openxmlformats.org/presentationml/2006/main">
+  <p:cSld>
+    <p:bg>
+      <p:bgPr>
+        <a:solidFill>
+          <a:schemeClr val="bg1"/>
+        </a:solidFill>
+        <a:effectLst/>
+      </p:bgPr>
+    </p:bg>
+    <p:spTree>
+      <p:nvGrpSpPr>
+        <p:cNvPr id="1" name=""/>
+        <p:cNvGrpSpPr/>
+        <p:nvPr/>
+      </p:nvGrpSpPr>
+      <p:grpSpPr>
+        <a:xfrm>
+          <a:off x="0" y="0"/>
+          <a:ext cx="0" cy="0"/>
+          <a:chOff x="0" y="0"/>
+          <a:chExt cx="0" cy="0"/>
+        </a:xfrm>
+      </p:grpSpPr>
+      <p:pic>
+        <p:nvPicPr>
+          <p:cNvPr id="4" name="Picture 3" descr="A screenshot of a cell phone&#10;&#10;Description automatically generated">
+            <a:extLst>
+              <a:ext uri="{FF2B5EF4-FFF2-40B4-BE49-F238E27FC236}">
+                <a16:creationId xmlns:a16="http://schemas.microsoft.com/office/drawing/2014/main" id="{6FFFFB68-DC4B-4DFC-BC90-2872E47102F5}"/>
+              </a:ext>
+            </a:extLst>
+          </p:cNvPr>
+          <p:cNvPicPr>
+            <a:picLocks noChangeAspect="1"/>
+          </p:cNvPicPr>
+          <p:nvPr/>
+        </p:nvPicPr>
+        <p:blipFill>
+          <a:blip r:embed="rId2"/>
+          <a:stretch>
+            <a:fillRect/>
+          </a:stretch>
+        </p:blipFill>
+        <p:spPr>
+          <a:xfrm>
+            <a:off x="1761043" y="643467"/>
+            <a:ext cx="8669913" cy="5050225"/>
+          </a:xfrm>
+          <a:prstGeom prst="rect">
+            <a:avLst/>
+          </a:prstGeom>
+        </p:spPr>
+      </p:pic>
+      <p:sp>
+        <p:nvSpPr>
+          <p:cNvPr id="2" name="AutoShape 2">
+            <a:extLst>
+              <a:ext uri="{FF2B5EF4-FFF2-40B4-BE49-F238E27FC236}">
+                <a16:creationId xmlns:a16="http://schemas.microsoft.com/office/drawing/2014/main" id="{694956A4-ABF2-4115-A694-839CF6FE3E6B}"/>
+              </a:ext>
+            </a:extLst>
+          </p:cNvPr>
+          <p:cNvSpPr>
+            <a:spLocks noChangeAspect="1" noChangeArrowheads="1"/>
+          </p:cNvSpPr>
+          <p:nvPr/>
+        </p:nvSpPr>
+        <p:spPr bwMode="auto">
+          <a:xfrm>
+            <a:off x="5943600" y="3276600"/>
+            <a:ext cx="304800" cy="304800"/>
+          </a:xfrm>
+          <a:prstGeom prst="rect">
+            <a:avLst/>
+          </a:prstGeom>
+          <a:noFill/>
+          <a:extLst>
+            <a:ext uri="{909E8E84-426E-40DD-AFC4-6F175D3DCCD1}">
+              <a14:hiddenFill xmlns:a14="http://schemas.microsoft.com/office/drawing/2010/main">
+                <a:solidFill>
+                  <a:srgbClr val="FFFFFF"/>
+                </a:solidFill>
+              </a14:hiddenFill>
+            </a:ext>
+          </a:extLst>
+        </p:spPr>
+        <p:txBody>
+          <a:bodyPr vert="horz" wrap="square" lIns="91440" tIns="45720" rIns="91440" bIns="45720" numCol="1" anchor="t" anchorCtr="0" compatLnSpc="1">
+            <a:prstTxWarp prst="textNoShape">
+              <a:avLst/>
+            </a:prstTxWarp>
+          </a:bodyPr>
+          <a:lstStyle/>
+          <a:p>
+            <a:endParaRPr lang="en-US"/>
+          </a:p>
+        </p:txBody>
+      </p:sp>
+    </p:spTree>
+    <p:extLst>
+      <p:ext uri="{BB962C8B-B14F-4D97-AF65-F5344CB8AC3E}">
+        <p14:creationId xmlns:p14="http://schemas.microsoft.com/office/powerpoint/2010/main" val="2812201830"/>
+      </p:ext>
+    </p:extLst>
+  </p:cSld>
+  <p:clrMapOvr>
+    <a:masterClrMapping/>
+  </p:clrMapOvr>
+</p:sld>
+</file>
+
 <file path=ppt/slides/slide4.xml><?xml version="1.0" encoding="utf-8"?>
 <p:sld xmlns:a="http://schemas.openxmlformats.org/drawingml/2006/main" xmlns:r="http://schemas.openxmlformats.org/officeDocument/2006/relationships" xmlns:p="http://schemas.openxmlformats.org/presentationml/2006/main">
   <p:cSld>
@@ -16463,7 +16815,7 @@
           <a:lstStyle/>
           <a:p>
             <a:r>
-              <a:rPr lang="en-US" sz="3200" dirty="0"/>
+              <a:rPr lang="en-US" sz="4000" dirty="0"/>
               <a:t>What is COVID-19?</a:t>
             </a:r>
           </a:p>
@@ -16549,7 +16901,7 @@
         <p:spPr>
           <a:xfrm>
             <a:off x="1029609" y="2047082"/>
-            <a:ext cx="10697641" cy="4524315"/>
+            <a:ext cx="10697641" cy="3970318"/>
           </a:xfrm>
           <a:prstGeom prst="rect">
             <a:avLst/>
@@ -16563,115 +16915,133 @@
           <a:lstStyle/>
           <a:p>
             <a:pPr marL="285750" indent="-285750">
-              <a:buFont typeface="Arial" panose="020B0604020202020204" pitchFamily="34" charset="0"/>
-              <a:buChar char="•"/>
+              <a:buClr>
+                <a:schemeClr val="accent1"/>
+              </a:buClr>
+              <a:buFont typeface="Wingdings" panose="05000000000000000000" pitchFamily="2" charset="2"/>
+              <a:buChar char="§"/>
             </a:pPr>
             <a:r>
               <a:rPr lang="en-US" dirty="0"/>
-              <a:t>   COVID-19 is the name of the “novel coronavirus” disease, </a:t>
-            </a:r>
-          </a:p>
-          <a:p>
-            <a:endParaRPr lang="en-US" dirty="0"/>
+              <a:t>COVID-19 is the name of the “novel coronavirus” disease, </a:t>
+            </a:r>
           </a:p>
           <a:p>
             <a:pPr marL="285750" indent="-285750">
-              <a:buFont typeface="Arial" panose="020B0604020202020204" pitchFamily="34" charset="0"/>
-              <a:buChar char="•"/>
-            </a:pPr>
-            <a:r>
-              <a:rPr lang="en-US" dirty="0"/>
-              <a:t>    SARS-CoV-2 is the name of the virus that causes COVID-19.</a:t>
-            </a:r>
-          </a:p>
-          <a:p>
-            <a:pPr marL="285750" indent="-285750">
-              <a:buFont typeface="Arial" panose="020B0604020202020204" pitchFamily="34" charset="0"/>
-              <a:buChar char="•"/>
+              <a:buClr>
+                <a:schemeClr val="accent1"/>
+              </a:buClr>
+              <a:buFont typeface="Wingdings" panose="05000000000000000000" pitchFamily="2" charset="2"/>
+              <a:buChar char="§"/>
             </a:pPr>
             <a:endParaRPr lang="en-US" dirty="0"/>
           </a:p>
           <a:p>
             <a:pPr marL="285750" indent="-285750">
-              <a:buFont typeface="Arial" panose="020B0604020202020204" pitchFamily="34" charset="0"/>
-              <a:buChar char="•"/>
+              <a:buClr>
+                <a:schemeClr val="accent1"/>
+              </a:buClr>
+              <a:buFont typeface="Wingdings" panose="05000000000000000000" pitchFamily="2" charset="2"/>
+              <a:buChar char="§"/>
             </a:pPr>
             <a:r>
               <a:rPr lang="en-US" dirty="0"/>
-              <a:t>    COVID-19 spreads person-to-person via respiratory droplets from coughs or sneezes (like the flu),</a:t>
+              <a:t>SARS-CoV-2 is the name of the virus that causes COVID-19.</a:t>
             </a:r>
           </a:p>
           <a:p>
             <a:pPr marL="285750" indent="-285750">
-              <a:buFont typeface="Arial" panose="020B0604020202020204" pitchFamily="34" charset="0"/>
-              <a:buChar char="•"/>
-            </a:pPr>
-            <a:r>
-              <a:rPr lang="en-US" dirty="0"/>
-              <a:t>    by touching an object or surface with the virus on it, then touching mouth, nose, or eyes.</a:t>
-            </a:r>
-          </a:p>
-          <a:p>
-            <a:pPr marL="285750" indent="-285750">
-              <a:buFont typeface="Arial" panose="020B0604020202020204" pitchFamily="34" charset="0"/>
-              <a:buChar char="•"/>
+              <a:buClr>
+                <a:schemeClr val="accent1"/>
+              </a:buClr>
+              <a:buFont typeface="Wingdings" panose="05000000000000000000" pitchFamily="2" charset="2"/>
+              <a:buChar char="§"/>
             </a:pPr>
             <a:endParaRPr lang="en-US" dirty="0"/>
           </a:p>
           <a:p>
             <a:pPr marL="285750" indent="-285750">
-              <a:buFont typeface="Arial" panose="020B0604020202020204" pitchFamily="34" charset="0"/>
-              <a:buChar char="•"/>
+              <a:buClr>
+                <a:schemeClr val="accent1"/>
+              </a:buClr>
+              <a:buFont typeface="Wingdings" panose="05000000000000000000" pitchFamily="2" charset="2"/>
+              <a:buChar char="§"/>
             </a:pPr>
             <a:r>
               <a:rPr lang="en-US" dirty="0"/>
-              <a:t>    COVID-19 first case was reported in Hubei Province of China in December 2019.</a:t>
+              <a:t>COVID-19 first case was reported in Hubei Province of China in December 2019.</a:t>
             </a:r>
           </a:p>
           <a:p>
             <a:pPr marL="285750" indent="-285750">
-              <a:buFont typeface="Arial" panose="020B0604020202020204" pitchFamily="34" charset="0"/>
-              <a:buChar char="•"/>
+              <a:buClr>
+                <a:schemeClr val="accent1"/>
+              </a:buClr>
+              <a:buFont typeface="Wingdings" panose="05000000000000000000" pitchFamily="2" charset="2"/>
+              <a:buChar char="§"/>
             </a:pPr>
             <a:endParaRPr lang="en-US" dirty="0"/>
           </a:p>
           <a:p>
             <a:pPr marL="285750" indent="-285750">
-              <a:buFont typeface="Arial" panose="020B0604020202020204" pitchFamily="34" charset="0"/>
-              <a:buChar char="•"/>
+              <a:buClr>
+                <a:schemeClr val="accent1"/>
+              </a:buClr>
+              <a:buFont typeface="Wingdings" panose="05000000000000000000" pitchFamily="2" charset="2"/>
+              <a:buChar char="§"/>
             </a:pPr>
             <a:r>
               <a:rPr lang="en-US" dirty="0"/>
-              <a:t>    COVID-19 cause mild respiratory illnesses, such as the common cold, fever and shortness of breath.</a:t>
+              <a:t>COVID-19 spreads person-to-person via respiratory droplets from coughs or sneezes (like the flu), by touching an object or surface with the virus on it, then touching mouth, nose, or eyes.</a:t>
             </a:r>
           </a:p>
           <a:p>
             <a:pPr marL="285750" indent="-285750">
-              <a:buFont typeface="Arial" panose="020B0604020202020204" pitchFamily="34" charset="0"/>
-              <a:buChar char="•"/>
+              <a:buClr>
+                <a:schemeClr val="accent1"/>
+              </a:buClr>
+              <a:buFont typeface="Wingdings" panose="05000000000000000000" pitchFamily="2" charset="2"/>
+              <a:buChar char="§"/>
             </a:pPr>
             <a:endParaRPr lang="en-US" dirty="0"/>
           </a:p>
           <a:p>
             <a:pPr marL="285750" indent="-285750">
-              <a:buFont typeface="Arial" panose="020B0604020202020204" pitchFamily="34" charset="0"/>
-              <a:buChar char="•"/>
+              <a:buClr>
+                <a:schemeClr val="accent1"/>
+              </a:buClr>
+              <a:buFont typeface="Wingdings" panose="05000000000000000000" pitchFamily="2" charset="2"/>
+              <a:buChar char="§"/>
             </a:pPr>
             <a:r>
               <a:rPr lang="en-US" dirty="0"/>
-              <a:t>    COVID-19 Risk factors for severe illness may include: </a:t>
-            </a:r>
-          </a:p>
-          <a:p>
+              <a:t>Some common risk factors for severe illness may include: </a:t>
+            </a:r>
+          </a:p>
+          <a:p>
+            <a:pPr marL="742950" lvl="1" indent="-285750">
+              <a:buClr>
+                <a:schemeClr val="accent1"/>
+              </a:buClr>
+              <a:buFont typeface="Wingdings" panose="05000000000000000000" pitchFamily="2" charset="2"/>
+              <a:buChar char="§"/>
+            </a:pPr>
             <a:r>
               <a:rPr lang="en-US" dirty="0"/>
-              <a:t>          - Older age</a:t>
-            </a:r>
-          </a:p>
-          <a:p>
+              <a:t>Older age</a:t>
+            </a:r>
+          </a:p>
+          <a:p>
+            <a:pPr marL="742950" lvl="1" indent="-285750">
+              <a:buClr>
+                <a:schemeClr val="accent1"/>
+              </a:buClr>
+              <a:buFont typeface="Wingdings" panose="05000000000000000000" pitchFamily="2" charset="2"/>
+              <a:buChar char="§"/>
+            </a:pPr>
             <a:r>
               <a:rPr lang="en-US" dirty="0"/>
-              <a:t>          - Underlying chronic medical conditions</a:t>
+              <a:t>Underlying chronic medical conditions</a:t>
             </a:r>
           </a:p>
           <a:p>
@@ -16728,10 +17098,101 @@
             <p:ph type="title"/>
           </p:nvPr>
         </p:nvSpPr>
+        <p:spPr/>
+        <p:txBody>
+          <a:bodyPr>
+            <a:normAutofit/>
+          </a:bodyPr>
+          <a:lstStyle/>
+          <a:p>
+            <a:r>
+              <a:rPr lang="en-US" sz="4000" dirty="0"/>
+              <a:t>Symptoms of COVID-19</a:t>
+            </a:r>
+            <a:endParaRPr lang="en-US" sz="2800" dirty="0"/>
+          </a:p>
+        </p:txBody>
+      </p:sp>
+      <p:sp>
+        <p:nvSpPr>
+          <p:cNvPr id="3" name="Content Placeholder 2">
+            <a:extLst>
+              <a:ext uri="{FF2B5EF4-FFF2-40B4-BE49-F238E27FC236}">
+                <a16:creationId xmlns:a16="http://schemas.microsoft.com/office/drawing/2014/main" id="{3A57908A-961B-44EA-A47F-B2E850E8BC12}"/>
+              </a:ext>
+            </a:extLst>
+          </p:cNvPr>
+          <p:cNvSpPr>
+            <a:spLocks noGrp="1"/>
+          </p:cNvSpPr>
+          <p:nvPr>
+            <p:ph sz="half" idx="1"/>
+          </p:nvPr>
+        </p:nvSpPr>
+        <p:spPr/>
+        <p:txBody>
+          <a:bodyPr>
+            <a:normAutofit/>
+          </a:bodyPr>
+          <a:lstStyle/>
+          <a:p>
+            <a:pPr marL="0" indent="0">
+              <a:buNone/>
+            </a:pPr>
+            <a:r>
+              <a:rPr lang="en-US" dirty="0"/>
+              <a:t>   </a:t>
+            </a:r>
+          </a:p>
+          <a:p>
+            <a:pPr marL="0" indent="0">
+              <a:buNone/>
+            </a:pPr>
+            <a:endParaRPr lang="en-US" dirty="0"/>
+          </a:p>
+          <a:p>
+            <a:pPr marL="0" indent="0">
+              <a:buNone/>
+            </a:pPr>
+            <a:endParaRPr lang="en-US" dirty="0"/>
+          </a:p>
+          <a:p>
+            <a:pPr marL="0" indent="0">
+              <a:buNone/>
+            </a:pPr>
+            <a:endParaRPr lang="en-US" dirty="0"/>
+          </a:p>
+          <a:p>
+            <a:pPr marL="0" indent="0">
+              <a:buNone/>
+            </a:pPr>
+            <a:endParaRPr lang="en-US" dirty="0"/>
+          </a:p>
+          <a:p>
+            <a:endParaRPr lang="en-US" dirty="0"/>
+          </a:p>
+        </p:txBody>
+      </p:sp>
+      <p:sp>
+        <p:nvSpPr>
+          <p:cNvPr id="4" name="Content Placeholder 3">
+            <a:extLst>
+              <a:ext uri="{FF2B5EF4-FFF2-40B4-BE49-F238E27FC236}">
+                <a16:creationId xmlns:a16="http://schemas.microsoft.com/office/drawing/2014/main" id="{731B6E8A-6B9E-4B11-B7A1-FEB1B0B90D92}"/>
+              </a:ext>
+            </a:extLst>
+          </p:cNvPr>
+          <p:cNvSpPr>
+            <a:spLocks noGrp="1"/>
+          </p:cNvSpPr>
+          <p:nvPr>
+            <p:ph sz="half" idx="2"/>
+          </p:nvPr>
+        </p:nvSpPr>
         <p:spPr>
           <a:xfrm>
-            <a:off x="1097280" y="286603"/>
-            <a:ext cx="10058400" cy="1450757"/>
+            <a:off x="8653112" y="2120900"/>
+            <a:ext cx="2502568" cy="3748194"/>
           </a:xfrm>
         </p:spPr>
         <p:txBody>
@@ -16740,76 +17201,113 @@
           </a:bodyPr>
           <a:lstStyle/>
           <a:p>
-            <a:r>
-              <a:rPr lang="en-US" sz="3200" dirty="0"/>
-              <a:t>Symptoms of COVID-19</a:t>
-            </a:r>
-            <a:br>
-              <a:rPr lang="en-US" sz="3200" dirty="0"/>
-            </a:br>
-            <a:endParaRPr lang="en-US" sz="2000" dirty="0"/>
-          </a:p>
-        </p:txBody>
-      </p:sp>
-      <p:sp>
-        <p:nvSpPr>
-          <p:cNvPr id="3" name="Content Placeholder 2">
-            <a:extLst>
-              <a:ext uri="{FF2B5EF4-FFF2-40B4-BE49-F238E27FC236}">
-                <a16:creationId xmlns:a16="http://schemas.microsoft.com/office/drawing/2014/main" id="{3A57908A-961B-44EA-A47F-B2E850E8BC12}"/>
-              </a:ext>
-            </a:extLst>
-          </p:cNvPr>
-          <p:cNvSpPr>
-            <a:spLocks noGrp="1"/>
-          </p:cNvSpPr>
-          <p:nvPr>
-            <p:ph idx="1"/>
-          </p:nvPr>
-        </p:nvSpPr>
-        <p:spPr>
-          <a:xfrm>
-            <a:off x="1103991" y="2099812"/>
-            <a:ext cx="8493015" cy="3760891"/>
-          </a:xfrm>
-        </p:spPr>
-        <p:txBody>
-          <a:bodyPr>
-            <a:normAutofit/>
-          </a:bodyPr>
-          <a:lstStyle/>
-          <a:p>
-            <a:pPr marL="0" indent="0">
-              <a:buNone/>
+            <a:pPr algn="l"/>
+            <a:r>
+              <a:rPr lang="en-US" sz="1600" b="1" i="1" u="sng" dirty="0">
+                <a:solidFill>
+                  <a:srgbClr val="424242"/>
+                </a:solidFill>
+                <a:effectLst/>
+                <a:latin typeface="Arial" panose="020B0604020202020204" pitchFamily="34" charset="0"/>
+              </a:rPr>
+              <a:t>Emergency Warning Signs</a:t>
+            </a:r>
+          </a:p>
+          <a:p>
+            <a:pPr lvl="1">
+              <a:buFont typeface="Wingdings" panose="05000000000000000000" pitchFamily="2" charset="2"/>
+              <a:buChar char="§"/>
             </a:pPr>
             <a:r>
-              <a:rPr lang="en-US" dirty="0"/>
-              <a:t>   </a:t>
-            </a:r>
-          </a:p>
-          <a:p>
-            <a:pPr marL="0" indent="0">
-              <a:buNone/>
+              <a:rPr lang="en-US" sz="1600" i="1" dirty="0">
+                <a:solidFill>
+                  <a:srgbClr val="424242"/>
+                </a:solidFill>
+                <a:effectLst/>
+                <a:latin typeface="Arial" panose="020B0604020202020204" pitchFamily="34" charset="0"/>
+              </a:rPr>
+              <a:t>Fever or chills</a:t>
+            </a:r>
+          </a:p>
+          <a:p>
+            <a:pPr lvl="1">
+              <a:buFont typeface="Wingdings" panose="05000000000000000000" pitchFamily="2" charset="2"/>
+              <a:buChar char="§"/>
             </a:pPr>
-            <a:endParaRPr lang="en-US" dirty="0"/>
-          </a:p>
-          <a:p>
-            <a:pPr marL="0" indent="0">
-              <a:buNone/>
+            <a:r>
+              <a:rPr lang="en-US" sz="1600" i="1" dirty="0">
+                <a:solidFill>
+                  <a:srgbClr val="424242"/>
+                </a:solidFill>
+                <a:effectLst/>
+                <a:latin typeface="Arial" panose="020B0604020202020204" pitchFamily="34" charset="0"/>
+              </a:rPr>
+              <a:t>Trouble breathing</a:t>
+            </a:r>
+          </a:p>
+          <a:p>
+            <a:pPr lvl="1">
+              <a:buFont typeface="Wingdings" panose="05000000000000000000" pitchFamily="2" charset="2"/>
+              <a:buChar char="§"/>
             </a:pPr>
-            <a:endParaRPr lang="en-US" dirty="0"/>
-          </a:p>
-          <a:p>
-            <a:pPr marL="0" indent="0">
-              <a:buNone/>
+            <a:r>
+              <a:rPr lang="en-US" sz="1600" i="1" dirty="0">
+                <a:solidFill>
+                  <a:srgbClr val="424242"/>
+                </a:solidFill>
+                <a:effectLst/>
+                <a:latin typeface="Arial" panose="020B0604020202020204" pitchFamily="34" charset="0"/>
+              </a:rPr>
+              <a:t>Persistent pain or pressure in the chest</a:t>
+            </a:r>
+          </a:p>
+          <a:p>
+            <a:pPr lvl="1">
+              <a:buFont typeface="Wingdings" panose="05000000000000000000" pitchFamily="2" charset="2"/>
+              <a:buChar char="§"/>
             </a:pPr>
-            <a:endParaRPr lang="en-US" dirty="0"/>
-          </a:p>
-          <a:p>
-            <a:pPr marL="0" indent="0">
-              <a:buNone/>
+            <a:r>
+              <a:rPr lang="en-US" sz="1600" i="1" dirty="0">
+                <a:solidFill>
+                  <a:srgbClr val="424242"/>
+                </a:solidFill>
+                <a:effectLst/>
+                <a:latin typeface="Arial" panose="020B0604020202020204" pitchFamily="34" charset="0"/>
+              </a:rPr>
+              <a:t>New confusion</a:t>
+            </a:r>
+          </a:p>
+          <a:p>
+            <a:pPr lvl="1">
+              <a:buFont typeface="Wingdings" panose="05000000000000000000" pitchFamily="2" charset="2"/>
+              <a:buChar char="§"/>
             </a:pPr>
-            <a:endParaRPr lang="en-US" dirty="0"/>
+            <a:r>
+              <a:rPr lang="en-US" sz="1600" i="1" dirty="0">
+                <a:solidFill>
+                  <a:srgbClr val="424242"/>
+                </a:solidFill>
+                <a:effectLst/>
+                <a:latin typeface="Arial" panose="020B0604020202020204" pitchFamily="34" charset="0"/>
+              </a:rPr>
+              <a:t>Inability to wake or stay awake</a:t>
+            </a:r>
+          </a:p>
+          <a:p>
+            <a:pPr lvl="1">
+              <a:buFont typeface="Wingdings" panose="05000000000000000000" pitchFamily="2" charset="2"/>
+              <a:buChar char="§"/>
+            </a:pPr>
+            <a:r>
+              <a:rPr lang="en-US" sz="1600" i="1" dirty="0">
+                <a:solidFill>
+                  <a:srgbClr val="424242"/>
+                </a:solidFill>
+                <a:effectLst/>
+                <a:latin typeface="Arial" panose="020B0604020202020204" pitchFamily="34" charset="0"/>
+              </a:rPr>
+              <a:t>Bluish lips or face</a:t>
+            </a:r>
           </a:p>
           <a:p>
             <a:endParaRPr lang="en-US" dirty="0"/>
@@ -16830,7 +17328,7 @@
         </p:nvGrpSpPr>
         <p:grpSpPr>
           <a:xfrm>
-            <a:off x="4202605" y="2576793"/>
+            <a:off x="4892649" y="2549393"/>
             <a:ext cx="2015971" cy="3238211"/>
             <a:chOff x="3564010" y="1905289"/>
             <a:chExt cx="2015971" cy="3238211"/>
@@ -16961,7 +17459,7 @@
                 </a:spcAft>
                 <a:buNone/>
               </a:pPr>
-              <a:endParaRPr/>
+              <a:endParaRPr dirty="0"/>
             </a:p>
           </p:txBody>
         </p:sp>
@@ -17984,7 +18482,7 @@
         </p:nvSpPr>
         <p:spPr>
           <a:xfrm>
-            <a:off x="2387100" y="2208546"/>
+            <a:off x="3549195" y="2044582"/>
             <a:ext cx="1956300" cy="413946"/>
           </a:xfrm>
           <a:prstGeom prst="rect">
@@ -18272,7 +18770,7 @@
         </p:nvCxnSpPr>
         <p:spPr>
           <a:xfrm>
-            <a:off x="4306201" y="2397485"/>
+            <a:off x="4872301" y="2397222"/>
             <a:ext cx="700500" cy="743973"/>
           </a:xfrm>
           <a:prstGeom prst="bentConnector2">
@@ -18306,7 +18804,7 @@
         </p:nvSpPr>
         <p:spPr>
           <a:xfrm>
-            <a:off x="5873892" y="2259502"/>
+            <a:off x="6267866" y="2010479"/>
             <a:ext cx="1956300" cy="402600"/>
           </a:xfrm>
           <a:prstGeom prst="rect">
@@ -18592,7 +19090,7 @@
         </p:nvCxnSpPr>
         <p:spPr>
           <a:xfrm flipH="1">
-            <a:off x="5399591" y="2449017"/>
+            <a:off x="6072665" y="2332859"/>
             <a:ext cx="511500" cy="430800"/>
           </a:xfrm>
           <a:prstGeom prst="bentConnector3">
@@ -18626,7 +19124,7 @@
         </p:nvGrpSpPr>
         <p:grpSpPr>
           <a:xfrm>
-            <a:off x="4874169" y="3053640"/>
+            <a:off x="5500135" y="3041431"/>
             <a:ext cx="203546" cy="203573"/>
             <a:chOff x="4458256" y="3001815"/>
             <a:chExt cx="203546" cy="203573"/>
@@ -18807,7 +19305,7 @@
         </p:nvSpPr>
         <p:spPr>
           <a:xfrm>
-            <a:off x="1738828" y="3790954"/>
+            <a:off x="3115891" y="3592396"/>
             <a:ext cx="1956300" cy="402600"/>
           </a:xfrm>
           <a:prstGeom prst="rect">
@@ -19093,7 +19591,7 @@
         </p:nvCxnSpPr>
         <p:spPr>
           <a:xfrm rot="10800000" flipH="1">
-            <a:off x="3695129" y="3762594"/>
+            <a:off x="4379799" y="3743304"/>
             <a:ext cx="1458300" cy="202200"/>
           </a:xfrm>
           <a:prstGeom prst="bentConnector3">
@@ -19129,7 +19627,7 @@
         </p:nvSpPr>
         <p:spPr>
           <a:xfrm>
-            <a:off x="6628182" y="3613971"/>
+            <a:off x="6336975" y="3422487"/>
             <a:ext cx="2751219" cy="402600"/>
           </a:xfrm>
           <a:prstGeom prst="rect">
@@ -19415,7 +19913,7 @@
         </p:nvCxnSpPr>
         <p:spPr>
           <a:xfrm flipH="1">
-            <a:off x="5688350" y="3792674"/>
+            <a:off x="6353216" y="3774386"/>
             <a:ext cx="892800" cy="1126800"/>
           </a:xfrm>
           <a:prstGeom prst="bentConnector2">
@@ -19433,6 +19931,455 @@
           </a:ln>
         </p:spPr>
       </p:cxnSp>
+      <p:sp>
+        <p:nvSpPr>
+          <p:cNvPr id="32" name="Content Placeholder 3">
+            <a:extLst>
+              <a:ext uri="{FF2B5EF4-FFF2-40B4-BE49-F238E27FC236}">
+                <a16:creationId xmlns:a16="http://schemas.microsoft.com/office/drawing/2014/main" id="{BC60AF97-081B-425F-96C3-8E979B8A631F}"/>
+              </a:ext>
+            </a:extLst>
+          </p:cNvPr>
+          <p:cNvSpPr txBox="1">
+            <a:spLocks/>
+          </p:cNvSpPr>
+          <p:nvPr/>
+        </p:nvSpPr>
+        <p:spPr>
+          <a:xfrm>
+            <a:off x="1004035" y="2285779"/>
+            <a:ext cx="3072252" cy="3748194"/>
+          </a:xfrm>
+          <a:prstGeom prst="rect">
+            <a:avLst/>
+          </a:prstGeom>
+        </p:spPr>
+        <p:txBody>
+          <a:bodyPr vert="horz" lIns="0" tIns="45720" rIns="0" bIns="45720" rtlCol="0">
+            <a:normAutofit fontScale="92500" lnSpcReduction="20000"/>
+          </a:bodyPr>
+          <a:lstStyle>
+            <a:lvl1pPr marL="91440" indent="-91440" algn="l" defTabSz="914400" rtl="0" eaLnBrk="1" latinLnBrk="0" hangingPunct="1">
+              <a:lnSpc>
+                <a:spcPct val="110000"/>
+              </a:lnSpc>
+              <a:spcBef>
+                <a:spcPts val="1200"/>
+              </a:spcBef>
+              <a:spcAft>
+                <a:spcPts val="200"/>
+              </a:spcAft>
+              <a:buClr>
+                <a:schemeClr val="accent1"/>
+              </a:buClr>
+              <a:buSzPct val="100000"/>
+              <a:buFont typeface="Calibri" panose="020F0502020204030204" pitchFamily="34" charset="0"/>
+              <a:buChar char=" "/>
+              <a:defRPr sz="1900" kern="1200">
+                <a:solidFill>
+                  <a:schemeClr val="tx1">
+                    <a:lumMod val="75000"/>
+                    <a:lumOff val="25000"/>
+                  </a:schemeClr>
+                </a:solidFill>
+                <a:latin typeface="+mn-lt"/>
+                <a:ea typeface="+mn-ea"/>
+                <a:cs typeface="+mn-cs"/>
+              </a:defRPr>
+            </a:lvl1pPr>
+            <a:lvl2pPr marL="384048" indent="-182880" algn="l" defTabSz="914400" rtl="0" eaLnBrk="1" latinLnBrk="0" hangingPunct="1">
+              <a:lnSpc>
+                <a:spcPct val="100000"/>
+              </a:lnSpc>
+              <a:spcBef>
+                <a:spcPts val="200"/>
+              </a:spcBef>
+              <a:spcAft>
+                <a:spcPts val="400"/>
+              </a:spcAft>
+              <a:buClrTx/>
+              <a:buFont typeface="Calibri" pitchFamily="34" charset="0"/>
+              <a:buChar char="◦"/>
+              <a:defRPr sz="1700" kern="1200">
+                <a:solidFill>
+                  <a:schemeClr val="tx1">
+                    <a:lumMod val="75000"/>
+                    <a:lumOff val="25000"/>
+                  </a:schemeClr>
+                </a:solidFill>
+                <a:latin typeface="+mn-lt"/>
+                <a:ea typeface="+mn-ea"/>
+                <a:cs typeface="+mn-cs"/>
+              </a:defRPr>
+            </a:lvl2pPr>
+            <a:lvl3pPr marL="566928" indent="-182880" algn="l" defTabSz="914400" rtl="0" eaLnBrk="1" latinLnBrk="0" hangingPunct="1">
+              <a:lnSpc>
+                <a:spcPct val="100000"/>
+              </a:lnSpc>
+              <a:spcBef>
+                <a:spcPts val="200"/>
+              </a:spcBef>
+              <a:spcAft>
+                <a:spcPts val="400"/>
+              </a:spcAft>
+              <a:buClrTx/>
+              <a:buFont typeface="Calibri" pitchFamily="34" charset="0"/>
+              <a:buChar char="◦"/>
+              <a:defRPr sz="1300" kern="1200">
+                <a:solidFill>
+                  <a:schemeClr val="tx1">
+                    <a:lumMod val="75000"/>
+                    <a:lumOff val="25000"/>
+                  </a:schemeClr>
+                </a:solidFill>
+                <a:latin typeface="+mn-lt"/>
+                <a:ea typeface="+mn-ea"/>
+                <a:cs typeface="+mn-cs"/>
+              </a:defRPr>
+            </a:lvl3pPr>
+            <a:lvl4pPr marL="749808" indent="-182880" algn="l" defTabSz="914400" rtl="0" eaLnBrk="1" latinLnBrk="0" hangingPunct="1">
+              <a:lnSpc>
+                <a:spcPct val="100000"/>
+              </a:lnSpc>
+              <a:spcBef>
+                <a:spcPts val="200"/>
+              </a:spcBef>
+              <a:spcAft>
+                <a:spcPts val="400"/>
+              </a:spcAft>
+              <a:buClrTx/>
+              <a:buFont typeface="Calibri" pitchFamily="34" charset="0"/>
+              <a:buChar char="◦"/>
+              <a:defRPr sz="1300" kern="1200">
+                <a:solidFill>
+                  <a:schemeClr val="tx1">
+                    <a:lumMod val="75000"/>
+                    <a:lumOff val="25000"/>
+                  </a:schemeClr>
+                </a:solidFill>
+                <a:latin typeface="+mn-lt"/>
+                <a:ea typeface="+mn-ea"/>
+                <a:cs typeface="+mn-cs"/>
+              </a:defRPr>
+            </a:lvl4pPr>
+            <a:lvl5pPr marL="932688" indent="-182880" algn="l" defTabSz="914400" rtl="0" eaLnBrk="1" latinLnBrk="0" hangingPunct="1">
+              <a:lnSpc>
+                <a:spcPct val="100000"/>
+              </a:lnSpc>
+              <a:spcBef>
+                <a:spcPts val="200"/>
+              </a:spcBef>
+              <a:spcAft>
+                <a:spcPts val="400"/>
+              </a:spcAft>
+              <a:buClrTx/>
+              <a:buFont typeface="Calibri" pitchFamily="34" charset="0"/>
+              <a:buChar char="◦"/>
+              <a:defRPr sz="1300" kern="1200">
+                <a:solidFill>
+                  <a:schemeClr val="tx1">
+                    <a:lumMod val="75000"/>
+                    <a:lumOff val="25000"/>
+                  </a:schemeClr>
+                </a:solidFill>
+                <a:latin typeface="+mn-lt"/>
+                <a:ea typeface="+mn-ea"/>
+                <a:cs typeface="+mn-cs"/>
+              </a:defRPr>
+            </a:lvl5pPr>
+            <a:lvl6pPr marL="1100000" indent="-228600" algn="l" defTabSz="914400" rtl="0" eaLnBrk="1" latinLnBrk="0" hangingPunct="1">
+              <a:lnSpc>
+                <a:spcPct val="90000"/>
+              </a:lnSpc>
+              <a:spcBef>
+                <a:spcPts val="200"/>
+              </a:spcBef>
+              <a:spcAft>
+                <a:spcPts val="400"/>
+              </a:spcAft>
+              <a:buClr>
+                <a:schemeClr val="accent1"/>
+              </a:buClr>
+              <a:buFont typeface="Calibri" pitchFamily="34" charset="0"/>
+              <a:buChar char="◦"/>
+              <a:defRPr sz="1400" kern="1200">
+                <a:solidFill>
+                  <a:schemeClr val="tx1">
+                    <a:lumMod val="75000"/>
+                    <a:lumOff val="25000"/>
+                  </a:schemeClr>
+                </a:solidFill>
+                <a:latin typeface="+mn-lt"/>
+                <a:ea typeface="+mn-ea"/>
+                <a:cs typeface="+mn-cs"/>
+              </a:defRPr>
+            </a:lvl6pPr>
+            <a:lvl7pPr marL="1300000" indent="-228600" algn="l" defTabSz="914400" rtl="0" eaLnBrk="1" latinLnBrk="0" hangingPunct="1">
+              <a:lnSpc>
+                <a:spcPct val="90000"/>
+              </a:lnSpc>
+              <a:spcBef>
+                <a:spcPts val="200"/>
+              </a:spcBef>
+              <a:spcAft>
+                <a:spcPts val="400"/>
+              </a:spcAft>
+              <a:buClr>
+                <a:schemeClr val="accent1"/>
+              </a:buClr>
+              <a:buFont typeface="Calibri" pitchFamily="34" charset="0"/>
+              <a:buChar char="◦"/>
+              <a:defRPr sz="1400" kern="1200">
+                <a:solidFill>
+                  <a:schemeClr val="tx1">
+                    <a:lumMod val="75000"/>
+                    <a:lumOff val="25000"/>
+                  </a:schemeClr>
+                </a:solidFill>
+                <a:latin typeface="+mn-lt"/>
+                <a:ea typeface="+mn-ea"/>
+                <a:cs typeface="+mn-cs"/>
+              </a:defRPr>
+            </a:lvl7pPr>
+            <a:lvl8pPr marL="1500000" indent="-228600" algn="l" defTabSz="914400" rtl="0" eaLnBrk="1" latinLnBrk="0" hangingPunct="1">
+              <a:lnSpc>
+                <a:spcPct val="90000"/>
+              </a:lnSpc>
+              <a:spcBef>
+                <a:spcPts val="200"/>
+              </a:spcBef>
+              <a:spcAft>
+                <a:spcPts val="400"/>
+              </a:spcAft>
+              <a:buClr>
+                <a:schemeClr val="accent1"/>
+              </a:buClr>
+              <a:buFont typeface="Calibri" pitchFamily="34" charset="0"/>
+              <a:buChar char="◦"/>
+              <a:defRPr sz="1400" kern="1200">
+                <a:solidFill>
+                  <a:schemeClr val="tx1">
+                    <a:lumMod val="75000"/>
+                    <a:lumOff val="25000"/>
+                  </a:schemeClr>
+                </a:solidFill>
+                <a:latin typeface="+mn-lt"/>
+                <a:ea typeface="+mn-ea"/>
+                <a:cs typeface="+mn-cs"/>
+              </a:defRPr>
+            </a:lvl8pPr>
+            <a:lvl9pPr marL="1700000" indent="-228600" algn="l" defTabSz="914400" rtl="0" eaLnBrk="1" latinLnBrk="0" hangingPunct="1">
+              <a:lnSpc>
+                <a:spcPct val="90000"/>
+              </a:lnSpc>
+              <a:spcBef>
+                <a:spcPts val="200"/>
+              </a:spcBef>
+              <a:spcAft>
+                <a:spcPts val="400"/>
+              </a:spcAft>
+              <a:buClr>
+                <a:schemeClr val="accent1"/>
+              </a:buClr>
+              <a:buFont typeface="Calibri" pitchFamily="34" charset="0"/>
+              <a:buChar char="◦"/>
+              <a:defRPr sz="1400" kern="1200">
+                <a:solidFill>
+                  <a:schemeClr val="tx1">
+                    <a:lumMod val="75000"/>
+                    <a:lumOff val="25000"/>
+                  </a:schemeClr>
+                </a:solidFill>
+                <a:latin typeface="+mn-lt"/>
+                <a:ea typeface="+mn-ea"/>
+                <a:cs typeface="+mn-cs"/>
+              </a:defRPr>
+            </a:lvl9pPr>
+          </a:lstStyle>
+          <a:p>
+            <a:pPr marL="201168" lvl="1" indent="0">
+              <a:buNone/>
+            </a:pPr>
+            <a:r>
+              <a:rPr lang="en-US" b="1" i="1" u="sng" dirty="0">
+                <a:solidFill>
+                  <a:srgbClr val="424242"/>
+                </a:solidFill>
+                <a:latin typeface="Arial" panose="020B0604020202020204" pitchFamily="34" charset="0"/>
+              </a:rPr>
+              <a:t>Common Symptoms</a:t>
+            </a:r>
+          </a:p>
+          <a:p>
+            <a:pPr lvl="1">
+              <a:buFont typeface="Wingdings" panose="05000000000000000000" pitchFamily="2" charset="2"/>
+              <a:buChar char="§"/>
+            </a:pPr>
+            <a:r>
+              <a:rPr lang="en-US" i="1" dirty="0">
+                <a:solidFill>
+                  <a:srgbClr val="424242"/>
+                </a:solidFill>
+                <a:latin typeface="Arial" panose="020B0604020202020204" pitchFamily="34" charset="0"/>
+              </a:rPr>
+              <a:t>Fever or chills</a:t>
+            </a:r>
+          </a:p>
+          <a:p>
+            <a:pPr lvl="1">
+              <a:buFont typeface="Wingdings" panose="05000000000000000000" pitchFamily="2" charset="2"/>
+              <a:buChar char="§"/>
+            </a:pPr>
+            <a:r>
+              <a:rPr lang="en-US" i="1" dirty="0">
+                <a:solidFill>
+                  <a:srgbClr val="424242"/>
+                </a:solidFill>
+                <a:latin typeface="Arial" panose="020B0604020202020204" pitchFamily="34" charset="0"/>
+              </a:rPr>
+              <a:t>Cough</a:t>
+            </a:r>
+          </a:p>
+          <a:p>
+            <a:pPr lvl="1">
+              <a:buFont typeface="Wingdings" panose="05000000000000000000" pitchFamily="2" charset="2"/>
+              <a:buChar char="§"/>
+            </a:pPr>
+            <a:r>
+              <a:rPr lang="en-US" i="1" dirty="0">
+                <a:solidFill>
+                  <a:srgbClr val="424242"/>
+                </a:solidFill>
+                <a:latin typeface="Arial" panose="020B0604020202020204" pitchFamily="34" charset="0"/>
+              </a:rPr>
+              <a:t>Shortness of breath or difficulty breathing</a:t>
+            </a:r>
+          </a:p>
+          <a:p>
+            <a:pPr lvl="1">
+              <a:buFont typeface="Wingdings" panose="05000000000000000000" pitchFamily="2" charset="2"/>
+              <a:buChar char="§"/>
+            </a:pPr>
+            <a:r>
+              <a:rPr lang="en-US" i="1" dirty="0">
+                <a:solidFill>
+                  <a:srgbClr val="424242"/>
+                </a:solidFill>
+                <a:latin typeface="Arial" panose="020B0604020202020204" pitchFamily="34" charset="0"/>
+              </a:rPr>
+              <a:t>Fatigue</a:t>
+            </a:r>
+          </a:p>
+          <a:p>
+            <a:pPr lvl="1">
+              <a:buFont typeface="Wingdings" panose="05000000000000000000" pitchFamily="2" charset="2"/>
+              <a:buChar char="§"/>
+            </a:pPr>
+            <a:r>
+              <a:rPr lang="en-US" i="1" dirty="0">
+                <a:solidFill>
+                  <a:srgbClr val="424242"/>
+                </a:solidFill>
+                <a:latin typeface="Arial" panose="020B0604020202020204" pitchFamily="34" charset="0"/>
+              </a:rPr>
+              <a:t>Muscle or body aches</a:t>
+            </a:r>
+          </a:p>
+          <a:p>
+            <a:pPr lvl="1">
+              <a:buFont typeface="Wingdings" panose="05000000000000000000" pitchFamily="2" charset="2"/>
+              <a:buChar char="§"/>
+            </a:pPr>
+            <a:r>
+              <a:rPr lang="en-US" i="1" dirty="0">
+                <a:solidFill>
+                  <a:srgbClr val="424242"/>
+                </a:solidFill>
+                <a:latin typeface="Arial" panose="020B0604020202020204" pitchFamily="34" charset="0"/>
+              </a:rPr>
+              <a:t>Headache</a:t>
+            </a:r>
+          </a:p>
+          <a:p>
+            <a:pPr lvl="1">
+              <a:buFont typeface="Wingdings" panose="05000000000000000000" pitchFamily="2" charset="2"/>
+              <a:buChar char="§"/>
+            </a:pPr>
+            <a:r>
+              <a:rPr lang="en-US" i="1" dirty="0">
+                <a:solidFill>
+                  <a:srgbClr val="424242"/>
+                </a:solidFill>
+                <a:latin typeface="Arial" panose="020B0604020202020204" pitchFamily="34" charset="0"/>
+              </a:rPr>
+              <a:t>New loss of taste or smell</a:t>
+            </a:r>
+          </a:p>
+          <a:p>
+            <a:pPr lvl="1">
+              <a:buFont typeface="Wingdings" panose="05000000000000000000" pitchFamily="2" charset="2"/>
+              <a:buChar char="§"/>
+            </a:pPr>
+            <a:r>
+              <a:rPr lang="en-US" i="1" dirty="0">
+                <a:solidFill>
+                  <a:srgbClr val="424242"/>
+                </a:solidFill>
+                <a:latin typeface="Arial" panose="020B0604020202020204" pitchFamily="34" charset="0"/>
+              </a:rPr>
+              <a:t>Sore throat</a:t>
+            </a:r>
+          </a:p>
+          <a:p>
+            <a:pPr lvl="1">
+              <a:buFont typeface="Wingdings" panose="05000000000000000000" pitchFamily="2" charset="2"/>
+              <a:buChar char="§"/>
+            </a:pPr>
+            <a:r>
+              <a:rPr lang="en-US" i="1" dirty="0">
+                <a:solidFill>
+                  <a:srgbClr val="424242"/>
+                </a:solidFill>
+                <a:latin typeface="Arial" panose="020B0604020202020204" pitchFamily="34" charset="0"/>
+              </a:rPr>
+              <a:t>Congestion or runny nose</a:t>
+            </a:r>
+          </a:p>
+          <a:p>
+            <a:pPr lvl="1">
+              <a:buFont typeface="Wingdings" panose="05000000000000000000" pitchFamily="2" charset="2"/>
+              <a:buChar char="§"/>
+            </a:pPr>
+            <a:r>
+              <a:rPr lang="en-US" i="1" dirty="0">
+                <a:solidFill>
+                  <a:srgbClr val="424242"/>
+                </a:solidFill>
+                <a:latin typeface="Arial" panose="020B0604020202020204" pitchFamily="34" charset="0"/>
+              </a:rPr>
+              <a:t>Nausea or vomiting</a:t>
+            </a:r>
+          </a:p>
+          <a:p>
+            <a:pPr lvl="1">
+              <a:buFont typeface="Wingdings" panose="05000000000000000000" pitchFamily="2" charset="2"/>
+              <a:buChar char="§"/>
+            </a:pPr>
+            <a:r>
+              <a:rPr lang="en-US" i="1" dirty="0">
+                <a:solidFill>
+                  <a:srgbClr val="424242"/>
+                </a:solidFill>
+                <a:latin typeface="Arial" panose="020B0604020202020204" pitchFamily="34" charset="0"/>
+              </a:rPr>
+              <a:t>Diarrhea</a:t>
+            </a:r>
+          </a:p>
+          <a:p>
+            <a:endParaRPr lang="en-US" dirty="0"/>
+          </a:p>
+        </p:txBody>
+      </p:sp>
     </p:spTree>
     <p:extLst>
       <p:ext uri="{BB962C8B-B14F-4D97-AF65-F5344CB8AC3E}">
@@ -19525,7 +20472,25 @@
           </a:bodyPr>
           <a:lstStyle/>
           <a:p>
-            <a:pPr marL="0">
+            <a:pPr marL="0" indent="0">
+              <a:spcAft>
+                <a:spcPts val="0"/>
+              </a:spcAft>
+              <a:buNone/>
+            </a:pPr>
+            <a:r>
+              <a:rPr lang="en-US" dirty="0">
+                <a:latin typeface="Arial" panose="020B0604020202020204" pitchFamily="34" charset="0"/>
+                <a:cs typeface="Arial" panose="020B0604020202020204" pitchFamily="34" charset="0"/>
+              </a:rPr>
+              <a:t>What are the correlation between data?   </a:t>
+            </a:r>
+          </a:p>
+          <a:p>
+            <a:pPr marL="292608" lvl="1">
+              <a:spcBef>
+                <a:spcPts val="1200"/>
+              </a:spcBef>
               <a:spcAft>
                 <a:spcPts val="0"/>
               </a:spcAft>
@@ -19537,26 +20502,14 @@
                 <a:latin typeface="Arial" panose="020B0604020202020204" pitchFamily="34" charset="0"/>
                 <a:cs typeface="Arial" panose="020B0604020202020204" pitchFamily="34" charset="0"/>
               </a:rPr>
-              <a:t>   Community acquired vs hospital</a:t>
-            </a:r>
-          </a:p>
-          <a:p>
-            <a:pPr marL="0" indent="0">
-              <a:spcAft>
-                <a:spcPts val="0"/>
-              </a:spcAft>
-              <a:buNone/>
-            </a:pPr>
-            <a:r>
-              <a:rPr lang="en-US" dirty="0">
-                <a:latin typeface="Arial" panose="020B0604020202020204" pitchFamily="34" charset="0"/>
-                <a:cs typeface="Arial" panose="020B0604020202020204" pitchFamily="34" charset="0"/>
-              </a:rPr>
-              <a:t>     acquired</a:t>
-            </a:r>
-          </a:p>
-          <a:p>
-            <a:pPr marL="0">
+              <a:t> Community acquired vs hospital acquired</a:t>
+            </a:r>
+          </a:p>
+          <a:p>
+            <a:pPr marL="292608" lvl="1">
+              <a:spcBef>
+                <a:spcPts val="1200"/>
+              </a:spcBef>
               <a:spcAft>
                 <a:spcPts val="0"/>
               </a:spcAft>
@@ -19568,27 +20521,20 @@
                 <a:latin typeface="Arial" panose="020B0604020202020204" pitchFamily="34" charset="0"/>
                 <a:cs typeface="Arial" panose="020B0604020202020204" pitchFamily="34" charset="0"/>
               </a:rPr>
-              <a:t>   Age correlation with infection rate</a:t>
-            </a:r>
-          </a:p>
-          <a:p>
-            <a:pPr marL="0">
+              <a:t> Age and infection rate</a:t>
+            </a:r>
+          </a:p>
+          <a:p>
+            <a:pPr marL="292608" lvl="1">
+              <a:spcBef>
+                <a:spcPts val="1200"/>
+              </a:spcBef>
               <a:spcAft>
                 <a:spcPts val="0"/>
               </a:spcAft>
               <a:buFont typeface="Wingdings" panose="05000000000000000000" pitchFamily="2" charset="2"/>
               <a:buChar char="§"/>
             </a:pPr>
-            <a:r>
-              <a:rPr lang="en-US" dirty="0">
-                <a:solidFill>
-                  <a:schemeClr val="tx1"/>
-                </a:solidFill>
-                <a:latin typeface="Arial" panose="020B0604020202020204" pitchFamily="34" charset="0"/>
-                <a:cs typeface="Arial" panose="020B0604020202020204" pitchFamily="34" charset="0"/>
-              </a:rPr>
-              <a:t>   </a:t>
-            </a:r>
             <a:r>
               <a:rPr lang="en-US" b="0" dirty="0">
                 <a:solidFill>
@@ -19598,16 +20544,30 @@
                 <a:latin typeface="Arial" panose="020B0604020202020204" pitchFamily="34" charset="0"/>
                 <a:cs typeface="Arial" panose="020B0604020202020204" pitchFamily="34" charset="0"/>
               </a:rPr>
-              <a:t>Correlation between age, gender and </a:t>
-            </a:r>
-          </a:p>
-          <a:p>
-            <a:pPr marL="0" indent="0">
+              <a:t> Age, gender and service department</a:t>
+            </a:r>
+          </a:p>
+          <a:p>
+            <a:pPr marL="292608" lvl="1">
+              <a:spcBef>
+                <a:spcPts val="1200"/>
+              </a:spcBef>
               <a:spcAft>
                 <a:spcPts val="0"/>
               </a:spcAft>
-              <a:buNone/>
+              <a:buFont typeface="Wingdings" panose="05000000000000000000" pitchFamily="2" charset="2"/>
+              <a:buChar char="§"/>
             </a:pPr>
+            <a:r>
+              <a:rPr lang="en-US" dirty="0">
+                <a:solidFill>
+                  <a:schemeClr val="tx1"/>
+                </a:solidFill>
+                <a:latin typeface="Arial" panose="020B0604020202020204" pitchFamily="34" charset="0"/>
+                <a:cs typeface="Arial" panose="020B0604020202020204" pitchFamily="34" charset="0"/>
+              </a:rPr>
+              <a:t> A</a:t>
+            </a:r>
             <a:r>
               <a:rPr lang="en-US" b="0" dirty="0">
                 <a:solidFill>
@@ -19617,11 +20577,14 @@
                 <a:latin typeface="Arial" panose="020B0604020202020204" pitchFamily="34" charset="0"/>
                 <a:cs typeface="Arial" panose="020B0604020202020204" pitchFamily="34" charset="0"/>
               </a:rPr>
-              <a:t>     patient service department</a:t>
-            </a:r>
-          </a:p>
-          <a:p>
-            <a:pPr marL="0">
+              <a:t>ge, admit month, and admit year</a:t>
+            </a:r>
+          </a:p>
+          <a:p>
+            <a:pPr marL="292608" lvl="1">
+              <a:spcBef>
+                <a:spcPts val="1200"/>
+              </a:spcBef>
               <a:spcAft>
                 <a:spcPts val="0"/>
               </a:spcAft>
@@ -19636,47 +20599,7 @@
                 <a:latin typeface="Arial" panose="020B0604020202020204" pitchFamily="34" charset="0"/>
                 <a:cs typeface="Arial" panose="020B0604020202020204" pitchFamily="34" charset="0"/>
               </a:rPr>
-              <a:t>   C</a:t>
-            </a:r>
-            <a:r>
-              <a:rPr lang="en-US" b="0" dirty="0">
-                <a:solidFill>
-                  <a:schemeClr val="tx1"/>
-                </a:solidFill>
-                <a:effectLst/>
-                <a:latin typeface="Arial" panose="020B0604020202020204" pitchFamily="34" charset="0"/>
-                <a:cs typeface="Arial" panose="020B0604020202020204" pitchFamily="34" charset="0"/>
-              </a:rPr>
-              <a:t>orrelation between age, month, </a:t>
-            </a:r>
-          </a:p>
-          <a:p>
-            <a:pPr marL="0" indent="0">
-              <a:spcAft>
-                <a:spcPts val="0"/>
-              </a:spcAft>
-              <a:buNone/>
-            </a:pPr>
-            <a:r>
-              <a:rPr lang="en-US" dirty="0">
-                <a:solidFill>
-                  <a:schemeClr val="tx1"/>
-                </a:solidFill>
-                <a:latin typeface="Arial" panose="020B0604020202020204" pitchFamily="34" charset="0"/>
-                <a:cs typeface="Arial" panose="020B0604020202020204" pitchFamily="34" charset="0"/>
-              </a:rPr>
-              <a:t>     </a:t>
-            </a:r>
-            <a:r>
-              <a:rPr lang="en-US" b="0" dirty="0">
-                <a:solidFill>
-                  <a:schemeClr val="tx1"/>
-                </a:solidFill>
-                <a:effectLst/>
-                <a:latin typeface="Arial" panose="020B0604020202020204" pitchFamily="34" charset="0"/>
-                <a:cs typeface="Arial" panose="020B0604020202020204" pitchFamily="34" charset="0"/>
-              </a:rPr>
-              <a:t>and year</a:t>
+              <a:t> Length of stay and age</a:t>
             </a:r>
             <a:endParaRPr lang="en-US" dirty="0">
               <a:latin typeface="Arial" panose="020B0604020202020204" pitchFamily="34" charset="0"/>
@@ -19753,20 +20676,7 @@
                 <a:latin typeface="Arial" panose="020B0604020202020204" pitchFamily="34" charset="0"/>
                 <a:cs typeface="Arial" panose="020B0604020202020204" pitchFamily="34" charset="0"/>
               </a:rPr>
-              <a:t>   Length of stay</a:t>
-            </a:r>
-          </a:p>
-          <a:p>
-            <a:pPr>
-              <a:buFont typeface="Wingdings" panose="05000000000000000000" pitchFamily="2" charset="2"/>
-              <a:buChar char="§"/>
-            </a:pPr>
-            <a:r>
-              <a:rPr lang="en-US" dirty="0">
-                <a:latin typeface="Arial" panose="020B0604020202020204" pitchFamily="34" charset="0"/>
-                <a:cs typeface="Arial" panose="020B0604020202020204" pitchFamily="34" charset="0"/>
-              </a:rPr>
-              <a:t>   Lab related information</a:t>
+              <a:t>   Lab-related information</a:t>
             </a:r>
           </a:p>
           <a:p>
@@ -19792,7 +20702,7 @@
                 <a:latin typeface="Arial" panose="020B0604020202020204" pitchFamily="34" charset="0"/>
                 <a:cs typeface="Arial" panose="020B0604020202020204" pitchFamily="34" charset="0"/>
               </a:rPr>
-              <a:t>   Number of patients by date</a:t>
+              <a:t>   Number of patients by admit date</a:t>
             </a:r>
           </a:p>
           <a:p>
@@ -19805,7 +20715,7 @@
                 <a:latin typeface="Arial" panose="020B0604020202020204" pitchFamily="34" charset="0"/>
                 <a:cs typeface="Arial" panose="020B0604020202020204" pitchFamily="34" charset="0"/>
               </a:rPr>
-              <a:t>   Patients by gender</a:t>
+              <a:t>   Gender-related information</a:t>
             </a:r>
           </a:p>
           <a:p>
@@ -19818,7 +20728,7 @@
                 <a:latin typeface="Arial" panose="020B0604020202020204" pitchFamily="34" charset="0"/>
                 <a:cs typeface="Arial" panose="020B0604020202020204" pitchFamily="34" charset="0"/>
               </a:rPr>
-              <a:t>   Number of cases by month</a:t>
+              <a:t>   Number of cases (i.e. by month)</a:t>
             </a:r>
           </a:p>
           <a:p>
@@ -19926,7 +20836,7 @@
           <a:p>
             <a:r>
               <a:rPr lang="en-US" dirty="0"/>
-              <a:t>This data set is exclusively of patient who had tested positive for COVID-19. </a:t>
+              <a:t>This data set is exclusively of patients who had tested positive for COVID-19. </a:t>
             </a:r>
           </a:p>
           <a:p>
@@ -20271,22 +21181,6 @@
             <a:r>
               <a:rPr lang="en-US" sz="1800" i="1" dirty="0"/>
               <a:t>  Year range of admission (2018-2020)</a:t>
-            </a:r>
-          </a:p>
-          <a:p>
-            <a:pPr>
-              <a:lnSpc>
-                <a:spcPct val="100000"/>
-              </a:lnSpc>
-              <a:spcBef>
-                <a:spcPts val="600"/>
-              </a:spcBef>
-              <a:buFont typeface="Wingdings" panose="05000000000000000000" pitchFamily="2" charset="2"/>
-              <a:buChar char="§"/>
-            </a:pPr>
-            <a:r>
-              <a:rPr lang="en-US" sz="1800" i="1" dirty="0"/>
-              <a:t>  Primarily COVID 19 positive cases</a:t>
             </a:r>
           </a:p>
           <a:p>

</xml_diff>